<commit_message>
telechargement des pieces pour les cartes antennaires
</commit_message>
<xml_diff>
--- a/3D - UWB/antenne/image carte/Dimensionnement.pptx
+++ b/3D - UWB/antenne/image carte/Dimensionnement.pptx
@@ -6,7 +6,9 @@
   </p:sldMasterIdLst>
   <p:sldIdLst>
     <p:sldId id="256" r:id="rId2"/>
-    <p:sldId id="257" r:id="rId3"/>
+    <p:sldId id="258" r:id="rId3"/>
+    <p:sldId id="257" r:id="rId4"/>
+    <p:sldId id="259" r:id="rId5"/>
   </p:sldIdLst>
   <p:sldSz cx="12192000" cy="6858000"/>
   <p:notesSz cx="6858000" cy="9144000"/>
@@ -105,6 +107,11 @@
       </a:defRPr>
     </a:lvl9pPr>
   </p:defaultTextStyle>
+  <p:extLst>
+    <p:ext uri="{EFAFB233-063F-42B5-8137-9DF3F51BA10A}">
+      <p15:sldGuideLst xmlns:p15="http://schemas.microsoft.com/office/powerpoint/2012/main"/>
+    </p:ext>
+  </p:extLst>
 </p:presentation>
 </file>
 
@@ -255,7 +262,7 @@
           <a:p>
             <a:fld id="{60697E00-1AA6-47B4-8ADC-64C12E9C2F55}" type="datetimeFigureOut">
               <a:rPr lang="fr-FR" smtClean="0"/>
-              <a:t>23/02/2023</a:t>
+              <a:t>24/02/2023</a:t>
             </a:fld>
             <a:endParaRPr lang="fr-FR"/>
           </a:p>
@@ -453,7 +460,7 @@
           <a:p>
             <a:fld id="{60697E00-1AA6-47B4-8ADC-64C12E9C2F55}" type="datetimeFigureOut">
               <a:rPr lang="fr-FR" smtClean="0"/>
-              <a:t>23/02/2023</a:t>
+              <a:t>24/02/2023</a:t>
             </a:fld>
             <a:endParaRPr lang="fr-FR"/>
           </a:p>
@@ -661,7 +668,7 @@
           <a:p>
             <a:fld id="{60697E00-1AA6-47B4-8ADC-64C12E9C2F55}" type="datetimeFigureOut">
               <a:rPr lang="fr-FR" smtClean="0"/>
-              <a:t>23/02/2023</a:t>
+              <a:t>24/02/2023</a:t>
             </a:fld>
             <a:endParaRPr lang="fr-FR"/>
           </a:p>
@@ -859,7 +866,7 @@
           <a:p>
             <a:fld id="{60697E00-1AA6-47B4-8ADC-64C12E9C2F55}" type="datetimeFigureOut">
               <a:rPr lang="fr-FR" smtClean="0"/>
-              <a:t>23/02/2023</a:t>
+              <a:t>24/02/2023</a:t>
             </a:fld>
             <a:endParaRPr lang="fr-FR"/>
           </a:p>
@@ -1134,7 +1141,7 @@
           <a:p>
             <a:fld id="{60697E00-1AA6-47B4-8ADC-64C12E9C2F55}" type="datetimeFigureOut">
               <a:rPr lang="fr-FR" smtClean="0"/>
-              <a:t>23/02/2023</a:t>
+              <a:t>24/02/2023</a:t>
             </a:fld>
             <a:endParaRPr lang="fr-FR"/>
           </a:p>
@@ -1399,7 +1406,7 @@
           <a:p>
             <a:fld id="{60697E00-1AA6-47B4-8ADC-64C12E9C2F55}" type="datetimeFigureOut">
               <a:rPr lang="fr-FR" smtClean="0"/>
-              <a:t>23/02/2023</a:t>
+              <a:t>24/02/2023</a:t>
             </a:fld>
             <a:endParaRPr lang="fr-FR"/>
           </a:p>
@@ -1811,7 +1818,7 @@
           <a:p>
             <a:fld id="{60697E00-1AA6-47B4-8ADC-64C12E9C2F55}" type="datetimeFigureOut">
               <a:rPr lang="fr-FR" smtClean="0"/>
-              <a:t>23/02/2023</a:t>
+              <a:t>24/02/2023</a:t>
             </a:fld>
             <a:endParaRPr lang="fr-FR"/>
           </a:p>
@@ -1952,7 +1959,7 @@
           <a:p>
             <a:fld id="{60697E00-1AA6-47B4-8ADC-64C12E9C2F55}" type="datetimeFigureOut">
               <a:rPr lang="fr-FR" smtClean="0"/>
-              <a:t>23/02/2023</a:t>
+              <a:t>24/02/2023</a:t>
             </a:fld>
             <a:endParaRPr lang="fr-FR"/>
           </a:p>
@@ -2065,7 +2072,7 @@
           <a:p>
             <a:fld id="{60697E00-1AA6-47B4-8ADC-64C12E9C2F55}" type="datetimeFigureOut">
               <a:rPr lang="fr-FR" smtClean="0"/>
-              <a:t>23/02/2023</a:t>
+              <a:t>24/02/2023</a:t>
             </a:fld>
             <a:endParaRPr lang="fr-FR"/>
           </a:p>
@@ -2376,7 +2383,7 @@
           <a:p>
             <a:fld id="{60697E00-1AA6-47B4-8ADC-64C12E9C2F55}" type="datetimeFigureOut">
               <a:rPr lang="fr-FR" smtClean="0"/>
-              <a:t>23/02/2023</a:t>
+              <a:t>24/02/2023</a:t>
             </a:fld>
             <a:endParaRPr lang="fr-FR"/>
           </a:p>
@@ -2664,7 +2671,7 @@
           <a:p>
             <a:fld id="{60697E00-1AA6-47B4-8ADC-64C12E9C2F55}" type="datetimeFigureOut">
               <a:rPr lang="fr-FR" smtClean="0"/>
-              <a:t>23/02/2023</a:t>
+              <a:t>24/02/2023</a:t>
             </a:fld>
             <a:endParaRPr lang="fr-FR"/>
           </a:p>
@@ -2905,7 +2912,7 @@
           <a:p>
             <a:fld id="{60697E00-1AA6-47B4-8ADC-64C12E9C2F55}" type="datetimeFigureOut">
               <a:rPr lang="fr-FR" smtClean="0"/>
-              <a:t>23/02/2023</a:t>
+              <a:t>24/02/2023</a:t>
             </a:fld>
             <a:endParaRPr lang="fr-FR"/>
           </a:p>
@@ -3349,7 +3356,7 @@
         </p:blipFill>
         <p:spPr>
           <a:xfrm>
-            <a:off x="51255" y="71682"/>
+            <a:off x="0" y="-1247"/>
             <a:ext cx="5884617" cy="5921651"/>
           </a:xfrm>
           <a:prstGeom prst="rect">
@@ -3414,8 +3421,8 @@
         </p:nvSpPr>
         <p:spPr>
           <a:xfrm>
-            <a:off x="7972148" y="1292680"/>
-            <a:ext cx="4219852" cy="646331"/>
+            <a:off x="5884617" y="-1246"/>
+            <a:ext cx="6307383" cy="6463308"/>
           </a:xfrm>
           <a:prstGeom prst="rect">
             <a:avLst/>
@@ -3431,10 +3438,211 @@
             <a:r>
               <a:rPr lang="fr-FR" dirty="0">
                 <a:solidFill>
+                  <a:schemeClr val="accent6">
+                    <a:lumMod val="50000"/>
+                  </a:schemeClr>
+                </a:solidFill>
+              </a:rPr>
+              <a:t>Dimension connecteur (b) : l = 2,3mm, L = 10,5mm, h = 4,5mm</a:t>
+            </a:r>
+          </a:p>
+          <a:p>
+            <a:endParaRPr lang="fr-FR" dirty="0">
+              <a:solidFill>
+                <a:schemeClr val="accent6">
+                  <a:lumMod val="50000"/>
+                </a:schemeClr>
+              </a:solidFill>
+            </a:endParaRPr>
+          </a:p>
+          <a:p>
+            <a:r>
+              <a:rPr lang="fr-FR" dirty="0">
+                <a:solidFill>
+                  <a:schemeClr val="accent6">
+                    <a:lumMod val="50000"/>
+                  </a:schemeClr>
+                </a:solidFill>
+              </a:rPr>
+              <a:t>Distance con et bord de carte (c) : 14,6mm</a:t>
+            </a:r>
+          </a:p>
+          <a:p>
+            <a:endParaRPr lang="fr-FR" dirty="0">
+              <a:solidFill>
+                <a:schemeClr val="accent6">
+                  <a:lumMod val="50000"/>
+                </a:schemeClr>
+              </a:solidFill>
+            </a:endParaRPr>
+          </a:p>
+          <a:p>
+            <a:r>
+              <a:rPr lang="fr-FR" dirty="0">
+                <a:solidFill>
+                  <a:schemeClr val="accent6">
+                    <a:lumMod val="50000"/>
+                  </a:schemeClr>
+                </a:solidFill>
+              </a:rPr>
+              <a:t>Distance entre les deux connecteurs (d) :  17,5mm</a:t>
+            </a:r>
+          </a:p>
+          <a:p>
+            <a:endParaRPr lang="fr-FR" dirty="0">
+              <a:solidFill>
+                <a:srgbClr val="FF0000"/>
+              </a:solidFill>
+            </a:endParaRPr>
+          </a:p>
+          <a:p>
+            <a:r>
+              <a:rPr lang="fr-FR" dirty="0">
+                <a:solidFill>
                   <a:srgbClr val="FF0000"/>
                 </a:solidFill>
               </a:rPr>
-              <a:t>Distance entre le bord de carte et les connecteur (d)</a:t>
+              <a:t>Distance entre le bord de carte et les connecteur (d) : 1,6mm</a:t>
+            </a:r>
+          </a:p>
+          <a:p>
+            <a:endParaRPr lang="fr-FR" dirty="0">
+              <a:solidFill>
+                <a:srgbClr val="FF0000"/>
+              </a:solidFill>
+            </a:endParaRPr>
+          </a:p>
+          <a:p>
+            <a:r>
+              <a:rPr lang="fr-FR" dirty="0">
+                <a:solidFill>
+                  <a:srgbClr val="FF0000"/>
+                </a:solidFill>
+              </a:rPr>
+              <a:t>Distance entre connecteurs : 2,1mm</a:t>
+            </a:r>
+          </a:p>
+          <a:p>
+            <a:endParaRPr lang="fr-FR" dirty="0">
+              <a:solidFill>
+                <a:srgbClr val="FF0000"/>
+              </a:solidFill>
+            </a:endParaRPr>
+          </a:p>
+          <a:p>
+            <a:r>
+              <a:rPr lang="fr-FR" dirty="0">
+                <a:solidFill>
+                  <a:srgbClr val="FF0000"/>
+                </a:solidFill>
+              </a:rPr>
+              <a:t>Dimension du connecteur (e) : h = 8,1mm, l = 5mm, L = 20,8mm</a:t>
+            </a:r>
+          </a:p>
+          <a:p>
+            <a:endParaRPr lang="fr-FR" dirty="0">
+              <a:solidFill>
+                <a:srgbClr val="FF0000"/>
+              </a:solidFill>
+            </a:endParaRPr>
+          </a:p>
+          <a:p>
+            <a:r>
+              <a:rPr lang="fr-FR" dirty="0">
+                <a:solidFill>
+                  <a:srgbClr val="FF0000"/>
+                </a:solidFill>
+              </a:rPr>
+              <a:t>Dimension du connecteur (f) : h = 8,1mm, l = 5mm, L = 20,8mm</a:t>
+            </a:r>
+          </a:p>
+          <a:p>
+            <a:endParaRPr lang="fr-FR" dirty="0">
+              <a:solidFill>
+                <a:srgbClr val="FF0000"/>
+              </a:solidFill>
+            </a:endParaRPr>
+          </a:p>
+          <a:p>
+            <a:r>
+              <a:rPr lang="fr-FR" dirty="0">
+                <a:solidFill>
+                  <a:srgbClr val="FF0000"/>
+                </a:solidFill>
+              </a:rPr>
+              <a:t>Dimension du connecteur (g) : h = 8,1mm, l = 5mm, L = 25,8mm</a:t>
+            </a:r>
+          </a:p>
+          <a:p>
+            <a:endParaRPr lang="fr-FR" dirty="0">
+              <a:solidFill>
+                <a:srgbClr val="FF0000"/>
+              </a:solidFill>
+            </a:endParaRPr>
+          </a:p>
+          <a:p>
+            <a:r>
+              <a:rPr lang="fr-FR" dirty="0">
+                <a:solidFill>
+                  <a:srgbClr val="FF0000"/>
+                </a:solidFill>
+              </a:rPr>
+              <a:t>Dimension du connecteur (h) : h = 8,1mm, l = 5mm, L = 15,8mm</a:t>
+            </a:r>
+          </a:p>
+          <a:p>
+            <a:endParaRPr lang="fr-FR" dirty="0">
+              <a:solidFill>
+                <a:srgbClr val="FF0000"/>
+              </a:solidFill>
+            </a:endParaRPr>
+          </a:p>
+          <a:p>
+            <a:r>
+              <a:rPr lang="fr-FR" dirty="0">
+                <a:solidFill>
+                  <a:srgbClr val="00B0F0"/>
+                </a:solidFill>
+              </a:rPr>
+              <a:t>Dimension du connecteur (i) : 5,7mm</a:t>
+            </a:r>
+          </a:p>
+          <a:p>
+            <a:endParaRPr lang="fr-FR" dirty="0">
+              <a:solidFill>
+                <a:srgbClr val="FF0000"/>
+              </a:solidFill>
+            </a:endParaRPr>
+          </a:p>
+          <a:p>
+            <a:r>
+              <a:rPr lang="fr-FR" dirty="0">
+                <a:solidFill>
+                  <a:srgbClr val="00B0F0"/>
+                </a:solidFill>
+              </a:rPr>
+              <a:t>Distance Bord de carte et con USB (j) : 3,3mm</a:t>
+            </a:r>
+          </a:p>
+          <a:p>
+            <a:endParaRPr lang="fr-FR" dirty="0">
+              <a:solidFill>
+                <a:srgbClr val="FF0000"/>
+              </a:solidFill>
+            </a:endParaRPr>
+          </a:p>
+          <a:p>
+            <a:r>
+              <a:rPr lang="fr-FR" dirty="0"/>
+              <a:t>Dimension </a:t>
+            </a:r>
+            <a:r>
+              <a:rPr lang="fr-FR" dirty="0" err="1"/>
+              <a:t>board</a:t>
+            </a:r>
+            <a:r>
+              <a:rPr lang="fr-FR" dirty="0"/>
+              <a:t> (k) : l = 53mm, L  = 65,3mm, e = 1,7mm</a:t>
             </a:r>
           </a:p>
         </p:txBody>
@@ -3484,94 +3692,6 @@
           </a:fontRef>
         </p:style>
       </p:cxnSp>
-      <p:sp>
-        <p:nvSpPr>
-          <p:cNvPr id="13" name="ZoneTexte 12">
-            <a:extLst>
-              <a:ext uri="{FF2B5EF4-FFF2-40B4-BE49-F238E27FC236}">
-                <a16:creationId xmlns:a16="http://schemas.microsoft.com/office/drawing/2014/main" id="{D85B2294-6FD4-4C2B-8ED7-138FC8EFE988}"/>
-              </a:ext>
-            </a:extLst>
-          </p:cNvPr>
-          <p:cNvSpPr txBox="1"/>
-          <p:nvPr/>
-        </p:nvSpPr>
-        <p:spPr>
-          <a:xfrm>
-            <a:off x="7972148" y="0"/>
-            <a:ext cx="4219852" cy="369332"/>
-          </a:xfrm>
-          <a:prstGeom prst="rect">
-            <a:avLst/>
-          </a:prstGeom>
-          <a:noFill/>
-          <a:ln>
-            <a:noFill/>
-          </a:ln>
-        </p:spPr>
-        <p:txBody>
-          <a:bodyPr wrap="square" rtlCol="0">
-            <a:spAutoFit/>
-          </a:bodyPr>
-          <a:lstStyle/>
-          <a:p>
-            <a:r>
-              <a:rPr lang="fr-FR" dirty="0">
-                <a:solidFill>
-                  <a:schemeClr val="accent6">
-                    <a:lumMod val="50000"/>
-                  </a:schemeClr>
-                </a:solidFill>
-              </a:rPr>
-              <a:t>Dimension connecteur (b)</a:t>
-            </a:r>
-          </a:p>
-        </p:txBody>
-      </p:sp>
-      <p:sp>
-        <p:nvSpPr>
-          <p:cNvPr id="14" name="ZoneTexte 13">
-            <a:extLst>
-              <a:ext uri="{FF2B5EF4-FFF2-40B4-BE49-F238E27FC236}">
-                <a16:creationId xmlns:a16="http://schemas.microsoft.com/office/drawing/2014/main" id="{FFED74D5-C5D7-76EB-799B-F6CA7B429360}"/>
-              </a:ext>
-            </a:extLst>
-          </p:cNvPr>
-          <p:cNvSpPr txBox="1"/>
-          <p:nvPr/>
-        </p:nvSpPr>
-        <p:spPr>
-          <a:xfrm>
-            <a:off x="7972148" y="356682"/>
-            <a:ext cx="4316795" cy="369332"/>
-          </a:xfrm>
-          <a:prstGeom prst="rect">
-            <a:avLst/>
-          </a:prstGeom>
-          <a:noFill/>
-          <a:ln>
-            <a:noFill/>
-          </a:ln>
-        </p:spPr>
-        <p:txBody>
-          <a:bodyPr wrap="square" rtlCol="0">
-            <a:spAutoFit/>
-          </a:bodyPr>
-          <a:lstStyle/>
-          <a:p>
-            <a:r>
-              <a:rPr lang="fr-FR" dirty="0">
-                <a:solidFill>
-                  <a:schemeClr val="accent6">
-                    <a:lumMod val="50000"/>
-                  </a:schemeClr>
-                </a:solidFill>
-              </a:rPr>
-              <a:t>Distance con et bord de carte (c)</a:t>
-            </a:r>
-          </a:p>
-        </p:txBody>
-      </p:sp>
       <p:cxnSp>
         <p:nvCxnSpPr>
           <p:cNvPr id="15" name="Connecteur droit avec flèche 14">
@@ -3709,50 +3829,6 @@
       </p:cxnSp>
       <p:sp>
         <p:nvSpPr>
-          <p:cNvPr id="24" name="ZoneTexte 23">
-            <a:extLst>
-              <a:ext uri="{FF2B5EF4-FFF2-40B4-BE49-F238E27FC236}">
-                <a16:creationId xmlns:a16="http://schemas.microsoft.com/office/drawing/2014/main" id="{E1D03FCF-9333-47DA-C4F7-026CAF95A9BD}"/>
-              </a:ext>
-            </a:extLst>
-          </p:cNvPr>
-          <p:cNvSpPr txBox="1"/>
-          <p:nvPr/>
-        </p:nvSpPr>
-        <p:spPr>
-          <a:xfrm>
-            <a:off x="7972148" y="697564"/>
-            <a:ext cx="4219852" cy="369332"/>
-          </a:xfrm>
-          <a:prstGeom prst="rect">
-            <a:avLst/>
-          </a:prstGeom>
-          <a:noFill/>
-          <a:ln>
-            <a:noFill/>
-          </a:ln>
-        </p:spPr>
-        <p:txBody>
-          <a:bodyPr wrap="square" rtlCol="0">
-            <a:spAutoFit/>
-          </a:bodyPr>
-          <a:lstStyle/>
-          <a:p>
-            <a:r>
-              <a:rPr lang="fr-FR" dirty="0">
-                <a:solidFill>
-                  <a:schemeClr val="accent6">
-                    <a:lumMod val="50000"/>
-                  </a:schemeClr>
-                </a:solidFill>
-              </a:rPr>
-              <a:t>Distance entre les deux connecteurs (d)</a:t>
-            </a:r>
-          </a:p>
-        </p:txBody>
-      </p:sp>
-      <p:sp>
-        <p:nvSpPr>
           <p:cNvPr id="25" name="ZoneTexte 24">
             <a:extLst>
               <a:ext uri="{FF2B5EF4-FFF2-40B4-BE49-F238E27FC236}">
@@ -3931,162 +4007,6 @@
       </p:sp>
       <p:sp>
         <p:nvSpPr>
-          <p:cNvPr id="32" name="ZoneTexte 31">
-            <a:extLst>
-              <a:ext uri="{FF2B5EF4-FFF2-40B4-BE49-F238E27FC236}">
-                <a16:creationId xmlns:a16="http://schemas.microsoft.com/office/drawing/2014/main" id="{744629B6-5A7D-A44F-9343-8FFCC6A2F7AC}"/>
-              </a:ext>
-            </a:extLst>
-          </p:cNvPr>
-          <p:cNvSpPr txBox="1"/>
-          <p:nvPr/>
-        </p:nvSpPr>
-        <p:spPr>
-          <a:xfrm>
-            <a:off x="7972148" y="1922655"/>
-            <a:ext cx="4219852" cy="369332"/>
-          </a:xfrm>
-          <a:prstGeom prst="rect">
-            <a:avLst/>
-          </a:prstGeom>
-          <a:noFill/>
-        </p:spPr>
-        <p:txBody>
-          <a:bodyPr wrap="square" rtlCol="0">
-            <a:spAutoFit/>
-          </a:bodyPr>
-          <a:lstStyle/>
-          <a:p>
-            <a:r>
-              <a:rPr lang="fr-FR" dirty="0">
-                <a:solidFill>
-                  <a:srgbClr val="FF0000"/>
-                </a:solidFill>
-              </a:rPr>
-              <a:t>Dimension du connecteur (e)</a:t>
-            </a:r>
-          </a:p>
-        </p:txBody>
-      </p:sp>
-      <p:sp>
-        <p:nvSpPr>
-          <p:cNvPr id="33" name="ZoneTexte 32">
-            <a:extLst>
-              <a:ext uri="{FF2B5EF4-FFF2-40B4-BE49-F238E27FC236}">
-                <a16:creationId xmlns:a16="http://schemas.microsoft.com/office/drawing/2014/main" id="{DC78FC9C-A229-46C3-E24C-6962F66424A3}"/>
-              </a:ext>
-            </a:extLst>
-          </p:cNvPr>
-          <p:cNvSpPr txBox="1"/>
-          <p:nvPr/>
-        </p:nvSpPr>
-        <p:spPr>
-          <a:xfrm>
-            <a:off x="7972148" y="2347159"/>
-            <a:ext cx="4219852" cy="369332"/>
-          </a:xfrm>
-          <a:prstGeom prst="rect">
-            <a:avLst/>
-          </a:prstGeom>
-          <a:noFill/>
-        </p:spPr>
-        <p:txBody>
-          <a:bodyPr wrap="square" rtlCol="0">
-            <a:spAutoFit/>
-          </a:bodyPr>
-          <a:lstStyle/>
-          <a:p>
-            <a:r>
-              <a:rPr lang="fr-FR" dirty="0">
-                <a:solidFill>
-                  <a:srgbClr val="FF0000"/>
-                </a:solidFill>
-              </a:rPr>
-              <a:t>Dimension du connecteur (f)</a:t>
-            </a:r>
-          </a:p>
-        </p:txBody>
-      </p:sp>
-      <p:sp>
-        <p:nvSpPr>
-          <p:cNvPr id="34" name="ZoneTexte 33">
-            <a:extLst>
-              <a:ext uri="{FF2B5EF4-FFF2-40B4-BE49-F238E27FC236}">
-                <a16:creationId xmlns:a16="http://schemas.microsoft.com/office/drawing/2014/main" id="{C8CAA8DB-F391-71A5-F6EB-1E6DFBFDEF7A}"/>
-              </a:ext>
-            </a:extLst>
-          </p:cNvPr>
-          <p:cNvSpPr txBox="1"/>
-          <p:nvPr/>
-        </p:nvSpPr>
-        <p:spPr>
-          <a:xfrm>
-            <a:off x="7972148" y="2771663"/>
-            <a:ext cx="4219852" cy="369332"/>
-          </a:xfrm>
-          <a:prstGeom prst="rect">
-            <a:avLst/>
-          </a:prstGeom>
-          <a:noFill/>
-        </p:spPr>
-        <p:txBody>
-          <a:bodyPr wrap="square" rtlCol="0">
-            <a:spAutoFit/>
-          </a:bodyPr>
-          <a:lstStyle/>
-          <a:p>
-            <a:r>
-              <a:rPr lang="fr-FR" dirty="0">
-                <a:solidFill>
-                  <a:srgbClr val="FF0000"/>
-                </a:solidFill>
-              </a:rPr>
-              <a:t>Dimension du connecteur (g)</a:t>
-            </a:r>
-          </a:p>
-        </p:txBody>
-      </p:sp>
-      <p:sp>
-        <p:nvSpPr>
-          <p:cNvPr id="35" name="ZoneTexte 34">
-            <a:extLst>
-              <a:ext uri="{FF2B5EF4-FFF2-40B4-BE49-F238E27FC236}">
-                <a16:creationId xmlns:a16="http://schemas.microsoft.com/office/drawing/2014/main" id="{2072DF0A-0736-1C14-1ED6-02CF87EAAC24}"/>
-              </a:ext>
-            </a:extLst>
-          </p:cNvPr>
-          <p:cNvSpPr txBox="1"/>
-          <p:nvPr/>
-        </p:nvSpPr>
-        <p:spPr>
-          <a:xfrm>
-            <a:off x="7972148" y="3196167"/>
-            <a:ext cx="4219852" cy="369332"/>
-          </a:xfrm>
-          <a:prstGeom prst="rect">
-            <a:avLst/>
-          </a:prstGeom>
-          <a:noFill/>
-        </p:spPr>
-        <p:txBody>
-          <a:bodyPr wrap="square" rtlCol="0">
-            <a:spAutoFit/>
-          </a:bodyPr>
-          <a:lstStyle/>
-          <a:p>
-            <a:r>
-              <a:rPr lang="fr-FR" dirty="0">
-                <a:solidFill>
-                  <a:srgbClr val="FF0000"/>
-                </a:solidFill>
-              </a:rPr>
-              <a:t>Dimension du connecteur (h)</a:t>
-            </a:r>
-          </a:p>
-        </p:txBody>
-      </p:sp>
-      <p:sp>
-        <p:nvSpPr>
           <p:cNvPr id="36" name="ZoneTexte 35">
             <a:extLst>
               <a:ext uri="{FF2B5EF4-FFF2-40B4-BE49-F238E27FC236}">
@@ -4210,45 +4130,6 @@
                 </a:solidFill>
               </a:rPr>
               <a:t>(g)</a:t>
-            </a:r>
-          </a:p>
-        </p:txBody>
-      </p:sp>
-      <p:sp>
-        <p:nvSpPr>
-          <p:cNvPr id="39" name="ZoneTexte 38">
-            <a:extLst>
-              <a:ext uri="{FF2B5EF4-FFF2-40B4-BE49-F238E27FC236}">
-                <a16:creationId xmlns:a16="http://schemas.microsoft.com/office/drawing/2014/main" id="{FE2D2E4A-EBA9-7FE8-1CC5-F415D3A791F6}"/>
-              </a:ext>
-            </a:extLst>
-          </p:cNvPr>
-          <p:cNvSpPr txBox="1"/>
-          <p:nvPr/>
-        </p:nvSpPr>
-        <p:spPr>
-          <a:xfrm>
-            <a:off x="7972148" y="3952835"/>
-            <a:ext cx="4219852" cy="369332"/>
-          </a:xfrm>
-          <a:prstGeom prst="rect">
-            <a:avLst/>
-          </a:prstGeom>
-          <a:noFill/>
-        </p:spPr>
-        <p:txBody>
-          <a:bodyPr wrap="square" rtlCol="0">
-            <a:spAutoFit/>
-          </a:bodyPr>
-          <a:lstStyle/>
-          <a:p>
-            <a:r>
-              <a:rPr lang="fr-FR" dirty="0">
-                <a:solidFill>
-                  <a:srgbClr val="00B0F0"/>
-                </a:solidFill>
-              </a:rPr>
-              <a:t>Dimension du connecteur (i)</a:t>
             </a:r>
           </a:p>
         </p:txBody>
@@ -4384,80 +4265,6 @@
           </a:p>
         </p:txBody>
       </p:sp>
-      <p:sp>
-        <p:nvSpPr>
-          <p:cNvPr id="47" name="ZoneTexte 46">
-            <a:extLst>
-              <a:ext uri="{FF2B5EF4-FFF2-40B4-BE49-F238E27FC236}">
-                <a16:creationId xmlns:a16="http://schemas.microsoft.com/office/drawing/2014/main" id="{88E31755-DA52-F9BF-418C-CDA698BB928B}"/>
-              </a:ext>
-            </a:extLst>
-          </p:cNvPr>
-          <p:cNvSpPr txBox="1"/>
-          <p:nvPr/>
-        </p:nvSpPr>
-        <p:spPr>
-          <a:xfrm>
-            <a:off x="7972148" y="4381348"/>
-            <a:ext cx="4219852" cy="369332"/>
-          </a:xfrm>
-          <a:prstGeom prst="rect">
-            <a:avLst/>
-          </a:prstGeom>
-          <a:noFill/>
-        </p:spPr>
-        <p:txBody>
-          <a:bodyPr wrap="square" rtlCol="0">
-            <a:spAutoFit/>
-          </a:bodyPr>
-          <a:lstStyle/>
-          <a:p>
-            <a:r>
-              <a:rPr lang="fr-FR" dirty="0">
-                <a:solidFill>
-                  <a:srgbClr val="00B0F0"/>
-                </a:solidFill>
-              </a:rPr>
-              <a:t>Distance Bord de carte et con USB (j)</a:t>
-            </a:r>
-          </a:p>
-        </p:txBody>
-      </p:sp>
-      <p:sp>
-        <p:nvSpPr>
-          <p:cNvPr id="48" name="ZoneTexte 47">
-            <a:extLst>
-              <a:ext uri="{FF2B5EF4-FFF2-40B4-BE49-F238E27FC236}">
-                <a16:creationId xmlns:a16="http://schemas.microsoft.com/office/drawing/2014/main" id="{F38E4F4D-3DA1-344A-0CCF-AD7A5E376C33}"/>
-              </a:ext>
-            </a:extLst>
-          </p:cNvPr>
-          <p:cNvSpPr txBox="1"/>
-          <p:nvPr/>
-        </p:nvSpPr>
-        <p:spPr>
-          <a:xfrm>
-            <a:off x="7972148" y="5103635"/>
-            <a:ext cx="4219852" cy="369332"/>
-          </a:xfrm>
-          <a:prstGeom prst="rect">
-            <a:avLst/>
-          </a:prstGeom>
-          <a:noFill/>
-        </p:spPr>
-        <p:txBody>
-          <a:bodyPr wrap="square" rtlCol="0">
-            <a:spAutoFit/>
-          </a:bodyPr>
-          <a:lstStyle/>
-          <a:p>
-            <a:r>
-              <a:rPr lang="fr-FR" dirty="0"/>
-              <a:t>Dimension carte et épaisseur board (k)</a:t>
-            </a:r>
-          </a:p>
-        </p:txBody>
-      </p:sp>
     </p:spTree>
     <p:extLst>
       <p:ext uri="{BB962C8B-B14F-4D97-AF65-F5344CB8AC3E}">
@@ -4488,10 +4295,2940 @@
           <a:chExt cx="0" cy="0"/>
         </a:xfrm>
       </p:grpSpPr>
+      <p:pic>
+        <p:nvPicPr>
+          <p:cNvPr id="5" name="Image 4" descr="Une image contenant texte, équipement électronique, circuit&#10;&#10;Description générée automatiquement">
+            <a:extLst>
+              <a:ext uri="{FF2B5EF4-FFF2-40B4-BE49-F238E27FC236}">
+                <a16:creationId xmlns:a16="http://schemas.microsoft.com/office/drawing/2014/main" id="{C399609A-4EB6-6732-C6BD-4064B319A76B}"/>
+              </a:ext>
+            </a:extLst>
+          </p:cNvPr>
+          <p:cNvPicPr>
+            <a:picLocks noChangeAspect="1"/>
+          </p:cNvPicPr>
+          <p:nvPr/>
+        </p:nvPicPr>
+        <p:blipFill rotWithShape="1">
+          <a:blip r:embed="rId2">
+            <a:extLst>
+              <a:ext uri="{28A0092B-C50C-407E-A947-70E740481C1C}">
+                <a14:useLocalDpi xmlns:a14="http://schemas.microsoft.com/office/drawing/2010/main" val="0"/>
+              </a:ext>
+            </a:extLst>
+          </a:blip>
+          <a:srcRect t="27075" b="19728"/>
+          <a:stretch/>
+        </p:blipFill>
+        <p:spPr>
+          <a:xfrm>
+            <a:off x="0" y="-1247"/>
+            <a:ext cx="5884617" cy="5921651"/>
+          </a:xfrm>
+          <a:prstGeom prst="rect">
+            <a:avLst/>
+          </a:prstGeom>
+        </p:spPr>
+      </p:pic>
+      <p:sp>
+        <p:nvSpPr>
+          <p:cNvPr id="8" name="ZoneTexte 7">
+            <a:extLst>
+              <a:ext uri="{FF2B5EF4-FFF2-40B4-BE49-F238E27FC236}">
+                <a16:creationId xmlns:a16="http://schemas.microsoft.com/office/drawing/2014/main" id="{2AAD7242-1B51-0035-1FAB-38680ED26CEF}"/>
+              </a:ext>
+            </a:extLst>
+          </p:cNvPr>
+          <p:cNvSpPr txBox="1"/>
+          <p:nvPr/>
+        </p:nvSpPr>
+        <p:spPr>
+          <a:xfrm>
+            <a:off x="5884617" y="-1246"/>
+            <a:ext cx="6307383" cy="3970318"/>
+          </a:xfrm>
+          <a:prstGeom prst="rect">
+            <a:avLst/>
+          </a:prstGeom>
+          <a:noFill/>
+        </p:spPr>
+        <p:txBody>
+          <a:bodyPr wrap="square" rtlCol="0">
+            <a:spAutoFit/>
+          </a:bodyPr>
+          <a:lstStyle/>
+          <a:p>
+            <a:r>
+              <a:rPr lang="fr-FR" dirty="0">
+                <a:solidFill>
+                  <a:schemeClr val="accent6">
+                    <a:lumMod val="50000"/>
+                  </a:schemeClr>
+                </a:solidFill>
+              </a:rPr>
+              <a:t>Distance bord de carte et con. (L) : d = 14,7</a:t>
+            </a:r>
+          </a:p>
+          <a:p>
+            <a:endParaRPr lang="fr-FR" dirty="0">
+              <a:solidFill>
+                <a:schemeClr val="accent6">
+                  <a:lumMod val="50000"/>
+                </a:schemeClr>
+              </a:solidFill>
+            </a:endParaRPr>
+          </a:p>
+          <a:p>
+            <a:endParaRPr lang="fr-FR" dirty="0">
+              <a:solidFill>
+                <a:srgbClr val="FF0000"/>
+              </a:solidFill>
+            </a:endParaRPr>
+          </a:p>
+          <a:p>
+            <a:r>
+              <a:rPr lang="fr-FR" dirty="0">
+                <a:solidFill>
+                  <a:srgbClr val="FF0000"/>
+                </a:solidFill>
+              </a:rPr>
+              <a:t>Distance entre le bord de carte con. H (M)  : d  = 0,5mm </a:t>
+            </a:r>
+          </a:p>
+          <a:p>
+            <a:endParaRPr lang="fr-FR" dirty="0">
+              <a:solidFill>
+                <a:srgbClr val="FF0000"/>
+              </a:solidFill>
+            </a:endParaRPr>
+          </a:p>
+          <a:p>
+            <a:r>
+              <a:rPr lang="fr-FR" dirty="0">
+                <a:solidFill>
+                  <a:srgbClr val="00B0F0"/>
+                </a:solidFill>
+              </a:rPr>
+              <a:t>Dimension connecteur USB (i) : 	Long. = 8 mm </a:t>
+            </a:r>
+            <a:br>
+              <a:rPr lang="fr-FR" dirty="0">
+                <a:solidFill>
+                  <a:srgbClr val="00B0F0"/>
+                </a:solidFill>
+              </a:rPr>
+            </a:br>
+            <a:r>
+              <a:rPr lang="fr-FR" dirty="0">
+                <a:solidFill>
+                  <a:srgbClr val="00B0F0"/>
+                </a:solidFill>
+              </a:rPr>
+              <a:t>				Larg.  = 5,7 mm</a:t>
+            </a:r>
+          </a:p>
+          <a:p>
+            <a:r>
+              <a:rPr lang="fr-FR" dirty="0">
+                <a:solidFill>
+                  <a:srgbClr val="00B0F0"/>
+                </a:solidFill>
+              </a:rPr>
+              <a:t>		(avec </a:t>
+            </a:r>
+            <a:r>
+              <a:rPr lang="fr-FR" dirty="0" err="1">
+                <a:solidFill>
+                  <a:srgbClr val="00B0F0"/>
+                </a:solidFill>
+              </a:rPr>
+              <a:t>ep</a:t>
+            </a:r>
+            <a:r>
+              <a:rPr lang="fr-FR" dirty="0">
+                <a:solidFill>
+                  <a:srgbClr val="00B0F0"/>
+                </a:solidFill>
+              </a:rPr>
+              <a:t> carte)	Haut. = 4,3 mm</a:t>
+            </a:r>
+          </a:p>
+          <a:p>
+            <a:endParaRPr lang="fr-FR" dirty="0">
+              <a:solidFill>
+                <a:srgbClr val="FF0000"/>
+              </a:solidFill>
+            </a:endParaRPr>
+          </a:p>
+          <a:p>
+            <a:endParaRPr lang="fr-FR" dirty="0">
+              <a:solidFill>
+                <a:srgbClr val="FF0000"/>
+              </a:solidFill>
+            </a:endParaRPr>
+          </a:p>
+          <a:p>
+            <a:r>
+              <a:rPr lang="fr-FR" dirty="0">
+                <a:solidFill>
+                  <a:srgbClr val="00B0F0"/>
+                </a:solidFill>
+              </a:rPr>
+              <a:t>Hauteur con. (j) avec </a:t>
+            </a:r>
+            <a:r>
+              <a:rPr lang="fr-FR" dirty="0" err="1">
+                <a:solidFill>
+                  <a:srgbClr val="00B0F0"/>
+                </a:solidFill>
+              </a:rPr>
+              <a:t>ep</a:t>
+            </a:r>
+            <a:r>
+              <a:rPr lang="fr-FR" dirty="0">
+                <a:solidFill>
+                  <a:srgbClr val="00B0F0"/>
+                </a:solidFill>
+              </a:rPr>
+              <a:t>. board : 8mm</a:t>
+            </a:r>
+          </a:p>
+          <a:p>
+            <a:r>
+              <a:rPr lang="fr-FR" dirty="0">
+                <a:solidFill>
+                  <a:srgbClr val="00B0F0"/>
+                </a:solidFill>
+              </a:rPr>
+              <a:t>Hauteur con. (k) avec </a:t>
+            </a:r>
+            <a:r>
+              <a:rPr lang="fr-FR" dirty="0" err="1">
+                <a:solidFill>
+                  <a:srgbClr val="00B0F0"/>
+                </a:solidFill>
+              </a:rPr>
+              <a:t>ep</a:t>
+            </a:r>
+            <a:r>
+              <a:rPr lang="fr-FR" dirty="0">
+                <a:solidFill>
+                  <a:srgbClr val="00B0F0"/>
+                </a:solidFill>
+              </a:rPr>
+              <a:t>. board : 10,5mm</a:t>
+            </a:r>
+          </a:p>
+          <a:p>
+            <a:endParaRPr lang="fr-FR" dirty="0">
+              <a:solidFill>
+                <a:srgbClr val="00B0F0"/>
+              </a:solidFill>
+            </a:endParaRPr>
+          </a:p>
+          <a:p>
+            <a:endParaRPr lang="fr-FR" dirty="0">
+              <a:solidFill>
+                <a:srgbClr val="00B0F0"/>
+              </a:solidFill>
+            </a:endParaRPr>
+          </a:p>
+        </p:txBody>
+      </p:sp>
+      <p:cxnSp>
+        <p:nvCxnSpPr>
+          <p:cNvPr id="19" name="Connecteur droit avec flèche 18">
+            <a:extLst>
+              <a:ext uri="{FF2B5EF4-FFF2-40B4-BE49-F238E27FC236}">
+                <a16:creationId xmlns:a16="http://schemas.microsoft.com/office/drawing/2014/main" id="{AC7417CC-4D90-936F-F38E-3AAAC74D2A35}"/>
+              </a:ext>
+            </a:extLst>
+          </p:cNvPr>
+          <p:cNvCxnSpPr>
+            <a:cxnSpLocks/>
+          </p:cNvCxnSpPr>
+          <p:nvPr/>
+        </p:nvCxnSpPr>
+        <p:spPr>
+          <a:xfrm flipH="1">
+            <a:off x="834501" y="5202315"/>
+            <a:ext cx="1053920" cy="0"/>
+          </a:xfrm>
+          <a:prstGeom prst="straightConnector1">
+            <a:avLst/>
+          </a:prstGeom>
+          <a:ln>
+            <a:solidFill>
+              <a:schemeClr val="accent6"/>
+            </a:solidFill>
+            <a:headEnd type="triangle"/>
+            <a:tailEnd type="triangle"/>
+          </a:ln>
+        </p:spPr>
+        <p:style>
+          <a:lnRef idx="1">
+            <a:schemeClr val="accent1"/>
+          </a:lnRef>
+          <a:fillRef idx="0">
+            <a:schemeClr val="accent1"/>
+          </a:fillRef>
+          <a:effectRef idx="0">
+            <a:schemeClr val="accent1"/>
+          </a:effectRef>
+          <a:fontRef idx="minor">
+            <a:schemeClr val="tx1"/>
+          </a:fontRef>
+        </p:style>
+      </p:cxnSp>
+      <p:sp>
+        <p:nvSpPr>
+          <p:cNvPr id="25" name="ZoneTexte 24">
+            <a:extLst>
+              <a:ext uri="{FF2B5EF4-FFF2-40B4-BE49-F238E27FC236}">
+                <a16:creationId xmlns:a16="http://schemas.microsoft.com/office/drawing/2014/main" id="{8F671858-30A2-6B14-457F-99257ABA4241}"/>
+              </a:ext>
+            </a:extLst>
+          </p:cNvPr>
+          <p:cNvSpPr txBox="1"/>
+          <p:nvPr/>
+        </p:nvSpPr>
+        <p:spPr>
+          <a:xfrm>
+            <a:off x="4495454" y="328232"/>
+            <a:ext cx="621436" cy="369332"/>
+          </a:xfrm>
+          <a:prstGeom prst="rect">
+            <a:avLst/>
+          </a:prstGeom>
+          <a:noFill/>
+          <a:ln>
+            <a:noFill/>
+          </a:ln>
+        </p:spPr>
+        <p:txBody>
+          <a:bodyPr wrap="square" rtlCol="0">
+            <a:spAutoFit/>
+          </a:bodyPr>
+          <a:lstStyle/>
+          <a:p>
+            <a:pPr algn="ctr"/>
+            <a:r>
+              <a:rPr lang="fr-FR" dirty="0">
+                <a:solidFill>
+                  <a:srgbClr val="FF0000"/>
+                </a:solidFill>
+              </a:rPr>
+              <a:t>(h)</a:t>
+            </a:r>
+          </a:p>
+        </p:txBody>
+      </p:sp>
+      <p:sp>
+        <p:nvSpPr>
+          <p:cNvPr id="37" name="ZoneTexte 36">
+            <a:extLst>
+              <a:ext uri="{FF2B5EF4-FFF2-40B4-BE49-F238E27FC236}">
+                <a16:creationId xmlns:a16="http://schemas.microsoft.com/office/drawing/2014/main" id="{DBDA8348-AEDE-28E0-EDC0-4578072631CA}"/>
+              </a:ext>
+            </a:extLst>
+          </p:cNvPr>
+          <p:cNvSpPr txBox="1"/>
+          <p:nvPr/>
+        </p:nvSpPr>
+        <p:spPr>
+          <a:xfrm>
+            <a:off x="769835" y="541348"/>
+            <a:ext cx="621436" cy="369332"/>
+          </a:xfrm>
+          <a:prstGeom prst="rect">
+            <a:avLst/>
+          </a:prstGeom>
+          <a:noFill/>
+          <a:ln>
+            <a:noFill/>
+          </a:ln>
+        </p:spPr>
+        <p:txBody>
+          <a:bodyPr wrap="square" rtlCol="0">
+            <a:spAutoFit/>
+          </a:bodyPr>
+          <a:lstStyle/>
+          <a:p>
+            <a:pPr algn="ctr"/>
+            <a:r>
+              <a:rPr lang="fr-FR" dirty="0">
+                <a:solidFill>
+                  <a:srgbClr val="FF0000"/>
+                </a:solidFill>
+              </a:rPr>
+              <a:t>(f)</a:t>
+            </a:r>
+          </a:p>
+        </p:txBody>
+      </p:sp>
+      <p:sp>
+        <p:nvSpPr>
+          <p:cNvPr id="38" name="ZoneTexte 37">
+            <a:extLst>
+              <a:ext uri="{FF2B5EF4-FFF2-40B4-BE49-F238E27FC236}">
+                <a16:creationId xmlns:a16="http://schemas.microsoft.com/office/drawing/2014/main" id="{D2227F72-5A2C-FA9D-5452-B8D1E89427CB}"/>
+              </a:ext>
+            </a:extLst>
+          </p:cNvPr>
+          <p:cNvSpPr txBox="1"/>
+          <p:nvPr/>
+        </p:nvSpPr>
+        <p:spPr>
+          <a:xfrm>
+            <a:off x="769835" y="2590247"/>
+            <a:ext cx="621436" cy="369332"/>
+          </a:xfrm>
+          <a:prstGeom prst="rect">
+            <a:avLst/>
+          </a:prstGeom>
+          <a:noFill/>
+          <a:ln>
+            <a:noFill/>
+          </a:ln>
+        </p:spPr>
+        <p:txBody>
+          <a:bodyPr wrap="square" rtlCol="0">
+            <a:spAutoFit/>
+          </a:bodyPr>
+          <a:lstStyle/>
+          <a:p>
+            <a:pPr algn="ctr"/>
+            <a:r>
+              <a:rPr lang="fr-FR" dirty="0">
+                <a:solidFill>
+                  <a:srgbClr val="FF0000"/>
+                </a:solidFill>
+              </a:rPr>
+              <a:t>(g)</a:t>
+            </a:r>
+          </a:p>
+        </p:txBody>
+      </p:sp>
+      <p:sp>
+        <p:nvSpPr>
+          <p:cNvPr id="2" name="ZoneTexte 1">
+            <a:extLst>
+              <a:ext uri="{FF2B5EF4-FFF2-40B4-BE49-F238E27FC236}">
+                <a16:creationId xmlns:a16="http://schemas.microsoft.com/office/drawing/2014/main" id="{29BE686D-4CD3-6BFD-1155-5DA83E690385}"/>
+              </a:ext>
+            </a:extLst>
+          </p:cNvPr>
+          <p:cNvSpPr txBox="1"/>
+          <p:nvPr/>
+        </p:nvSpPr>
+        <p:spPr>
+          <a:xfrm>
+            <a:off x="-4576" y="5150814"/>
+            <a:ext cx="2732074" cy="369332"/>
+          </a:xfrm>
+          <a:prstGeom prst="rect">
+            <a:avLst/>
+          </a:prstGeom>
+          <a:noFill/>
+          <a:ln>
+            <a:noFill/>
+          </a:ln>
+        </p:spPr>
+        <p:txBody>
+          <a:bodyPr wrap="square" rtlCol="0">
+            <a:spAutoFit/>
+          </a:bodyPr>
+          <a:lstStyle/>
+          <a:p>
+            <a:pPr algn="ctr"/>
+            <a:r>
+              <a:rPr lang="fr-FR" dirty="0">
+                <a:solidFill>
+                  <a:schemeClr val="accent6">
+                    <a:lumMod val="75000"/>
+                  </a:schemeClr>
+                </a:solidFill>
+              </a:rPr>
+              <a:t>(L)</a:t>
+            </a:r>
+          </a:p>
+        </p:txBody>
+      </p:sp>
+      <p:cxnSp>
+        <p:nvCxnSpPr>
+          <p:cNvPr id="4" name="Connecteur droit avec flèche 3">
+            <a:extLst>
+              <a:ext uri="{FF2B5EF4-FFF2-40B4-BE49-F238E27FC236}">
+                <a16:creationId xmlns:a16="http://schemas.microsoft.com/office/drawing/2014/main" id="{C27B447B-FF25-9FE6-13CA-9368665C2809}"/>
+              </a:ext>
+            </a:extLst>
+          </p:cNvPr>
+          <p:cNvCxnSpPr>
+            <a:cxnSpLocks/>
+          </p:cNvCxnSpPr>
+          <p:nvPr/>
+        </p:nvCxnSpPr>
+        <p:spPr>
+          <a:xfrm>
+            <a:off x="4328257" y="328232"/>
+            <a:ext cx="0" cy="249194"/>
+          </a:xfrm>
+          <a:prstGeom prst="straightConnector1">
+            <a:avLst/>
+          </a:prstGeom>
+          <a:ln>
+            <a:solidFill>
+              <a:srgbClr val="C00000"/>
+            </a:solidFill>
+            <a:headEnd type="triangle"/>
+            <a:tailEnd type="triangle"/>
+          </a:ln>
+        </p:spPr>
+        <p:style>
+          <a:lnRef idx="1">
+            <a:schemeClr val="accent1"/>
+          </a:lnRef>
+          <a:fillRef idx="0">
+            <a:schemeClr val="accent1"/>
+          </a:fillRef>
+          <a:effectRef idx="0">
+            <a:schemeClr val="accent1"/>
+          </a:effectRef>
+          <a:fontRef idx="minor">
+            <a:schemeClr val="tx1"/>
+          </a:fontRef>
+        </p:style>
+      </p:cxnSp>
+      <p:sp>
+        <p:nvSpPr>
+          <p:cNvPr id="9" name="ZoneTexte 8">
+            <a:extLst>
+              <a:ext uri="{FF2B5EF4-FFF2-40B4-BE49-F238E27FC236}">
+                <a16:creationId xmlns:a16="http://schemas.microsoft.com/office/drawing/2014/main" id="{88D94259-B87C-69A2-6578-DE7E8D5295E3}"/>
+              </a:ext>
+            </a:extLst>
+          </p:cNvPr>
+          <p:cNvSpPr txBox="1"/>
+          <p:nvPr/>
+        </p:nvSpPr>
+        <p:spPr>
+          <a:xfrm>
+            <a:off x="3814439" y="268163"/>
+            <a:ext cx="621436" cy="369332"/>
+          </a:xfrm>
+          <a:prstGeom prst="rect">
+            <a:avLst/>
+          </a:prstGeom>
+          <a:noFill/>
+          <a:ln>
+            <a:noFill/>
+          </a:ln>
+        </p:spPr>
+        <p:txBody>
+          <a:bodyPr wrap="square" rtlCol="0">
+            <a:spAutoFit/>
+          </a:bodyPr>
+          <a:lstStyle/>
+          <a:p>
+            <a:pPr algn="ctr"/>
+            <a:r>
+              <a:rPr lang="fr-FR" dirty="0">
+                <a:solidFill>
+                  <a:srgbClr val="FF0000"/>
+                </a:solidFill>
+              </a:rPr>
+              <a:t>(M)</a:t>
+            </a:r>
+          </a:p>
+        </p:txBody>
+      </p:sp>
+      <p:sp>
+        <p:nvSpPr>
+          <p:cNvPr id="10" name="ZoneTexte 9">
+            <a:extLst>
+              <a:ext uri="{FF2B5EF4-FFF2-40B4-BE49-F238E27FC236}">
+                <a16:creationId xmlns:a16="http://schemas.microsoft.com/office/drawing/2014/main" id="{F1842364-B710-B70B-4C15-BC3558F84FC5}"/>
+              </a:ext>
+            </a:extLst>
+          </p:cNvPr>
+          <p:cNvSpPr txBox="1"/>
+          <p:nvPr/>
+        </p:nvSpPr>
+        <p:spPr>
+          <a:xfrm>
+            <a:off x="4806172" y="4681037"/>
+            <a:ext cx="621436" cy="369332"/>
+          </a:xfrm>
+          <a:prstGeom prst="rect">
+            <a:avLst/>
+          </a:prstGeom>
+          <a:noFill/>
+          <a:ln>
+            <a:noFill/>
+          </a:ln>
+        </p:spPr>
+        <p:txBody>
+          <a:bodyPr wrap="square" rtlCol="0">
+            <a:spAutoFit/>
+          </a:bodyPr>
+          <a:lstStyle/>
+          <a:p>
+            <a:pPr algn="ctr"/>
+            <a:r>
+              <a:rPr lang="fr-FR" dirty="0">
+                <a:solidFill>
+                  <a:srgbClr val="00B0F0"/>
+                </a:solidFill>
+              </a:rPr>
+              <a:t>(i)</a:t>
+            </a:r>
+          </a:p>
+        </p:txBody>
+      </p:sp>
+      <p:sp>
+        <p:nvSpPr>
+          <p:cNvPr id="11" name="ZoneTexte 10">
+            <a:extLst>
+              <a:ext uri="{FF2B5EF4-FFF2-40B4-BE49-F238E27FC236}">
+                <a16:creationId xmlns:a16="http://schemas.microsoft.com/office/drawing/2014/main" id="{8C4DF220-C90A-9B41-ADC3-4CCA5E401816}"/>
+              </a:ext>
+            </a:extLst>
+          </p:cNvPr>
+          <p:cNvSpPr txBox="1"/>
+          <p:nvPr/>
+        </p:nvSpPr>
+        <p:spPr>
+          <a:xfrm>
+            <a:off x="4181775" y="3811002"/>
+            <a:ext cx="621436" cy="369332"/>
+          </a:xfrm>
+          <a:prstGeom prst="rect">
+            <a:avLst/>
+          </a:prstGeom>
+          <a:noFill/>
+          <a:ln>
+            <a:noFill/>
+          </a:ln>
+        </p:spPr>
+        <p:txBody>
+          <a:bodyPr wrap="square" rtlCol="0">
+            <a:spAutoFit/>
+          </a:bodyPr>
+          <a:lstStyle/>
+          <a:p>
+            <a:pPr algn="ctr"/>
+            <a:r>
+              <a:rPr lang="fr-FR" dirty="0">
+                <a:solidFill>
+                  <a:srgbClr val="00B0F0"/>
+                </a:solidFill>
+              </a:rPr>
+              <a:t>(j)</a:t>
+            </a:r>
+          </a:p>
+        </p:txBody>
+      </p:sp>
+      <p:sp>
+        <p:nvSpPr>
+          <p:cNvPr id="13" name="ZoneTexte 12">
+            <a:extLst>
+              <a:ext uri="{FF2B5EF4-FFF2-40B4-BE49-F238E27FC236}">
+                <a16:creationId xmlns:a16="http://schemas.microsoft.com/office/drawing/2014/main" id="{F956EFAD-3BF6-97C2-6112-FB2289987E66}"/>
+              </a:ext>
+            </a:extLst>
+          </p:cNvPr>
+          <p:cNvSpPr txBox="1"/>
+          <p:nvPr/>
+        </p:nvSpPr>
+        <p:spPr>
+          <a:xfrm>
+            <a:off x="1867706" y="2161264"/>
+            <a:ext cx="621436" cy="369332"/>
+          </a:xfrm>
+          <a:prstGeom prst="rect">
+            <a:avLst/>
+          </a:prstGeom>
+          <a:noFill/>
+          <a:ln>
+            <a:noFill/>
+          </a:ln>
+        </p:spPr>
+        <p:txBody>
+          <a:bodyPr wrap="square" rtlCol="0">
+            <a:spAutoFit/>
+          </a:bodyPr>
+          <a:lstStyle/>
+          <a:p>
+            <a:pPr algn="ctr"/>
+            <a:r>
+              <a:rPr lang="fr-FR" dirty="0">
+                <a:solidFill>
+                  <a:srgbClr val="00B0F0"/>
+                </a:solidFill>
+              </a:rPr>
+              <a:t>(k)</a:t>
+            </a:r>
+          </a:p>
+        </p:txBody>
+      </p:sp>
+    </p:spTree>
+    <p:extLst>
+      <p:ext uri="{BB962C8B-B14F-4D97-AF65-F5344CB8AC3E}">
+        <p14:creationId xmlns:p14="http://schemas.microsoft.com/office/powerpoint/2010/main" val="3921685559"/>
+      </p:ext>
+    </p:extLst>
+  </p:cSld>
+  <p:clrMapOvr>
+    <a:masterClrMapping/>
+  </p:clrMapOvr>
+</p:sld>
+</file>
+
+<file path=ppt/slides/slide3.xml><?xml version="1.0" encoding="utf-8"?>
+<p:sld xmlns:a="http://schemas.openxmlformats.org/drawingml/2006/main" xmlns:r="http://schemas.openxmlformats.org/officeDocument/2006/relationships" xmlns:p="http://schemas.openxmlformats.org/presentationml/2006/main">
+  <p:cSld>
+    <p:spTree>
+      <p:nvGrpSpPr>
+        <p:cNvPr id="1" name=""/>
+        <p:cNvGrpSpPr/>
+        <p:nvPr/>
+      </p:nvGrpSpPr>
+      <p:grpSpPr>
+        <a:xfrm>
+          <a:off x="0" y="0"/>
+          <a:ext cx="0" cy="0"/>
+          <a:chOff x="0" y="0"/>
+          <a:chExt cx="0" cy="0"/>
+        </a:xfrm>
+      </p:grpSpPr>
+      <p:pic>
+        <p:nvPicPr>
+          <p:cNvPr id="3" name="Image 2" descr="Une image contenant texte, équipement électronique&#10;&#10;Description générée automatiquement">
+            <a:extLst>
+              <a:ext uri="{FF2B5EF4-FFF2-40B4-BE49-F238E27FC236}">
+                <a16:creationId xmlns:a16="http://schemas.microsoft.com/office/drawing/2014/main" id="{D0D28EC0-FD97-1FB0-DC87-CF367E90238E}"/>
+              </a:ext>
+            </a:extLst>
+          </p:cNvPr>
+          <p:cNvPicPr>
+            <a:picLocks noChangeAspect="1"/>
+          </p:cNvPicPr>
+          <p:nvPr/>
+        </p:nvPicPr>
+        <p:blipFill rotWithShape="1">
+          <a:blip r:embed="rId2">
+            <a:extLst>
+              <a:ext uri="{28A0092B-C50C-407E-A947-70E740481C1C}">
+                <a14:useLocalDpi xmlns:a14="http://schemas.microsoft.com/office/drawing/2010/main" val="0"/>
+              </a:ext>
+            </a:extLst>
+          </a:blip>
+          <a:srcRect t="32038" b="23261"/>
+          <a:stretch/>
+        </p:blipFill>
+        <p:spPr>
+          <a:xfrm>
+            <a:off x="0" y="0"/>
+            <a:ext cx="5933732" cy="5017336"/>
+          </a:xfrm>
+          <a:prstGeom prst="rect">
+            <a:avLst/>
+          </a:prstGeom>
+        </p:spPr>
+      </p:pic>
+      <p:sp>
+        <p:nvSpPr>
+          <p:cNvPr id="4" name="ZoneTexte 3">
+            <a:extLst>
+              <a:ext uri="{FF2B5EF4-FFF2-40B4-BE49-F238E27FC236}">
+                <a16:creationId xmlns:a16="http://schemas.microsoft.com/office/drawing/2014/main" id="{7BC3F638-BD92-BC8D-CF95-0CEB196505E5}"/>
+              </a:ext>
+            </a:extLst>
+          </p:cNvPr>
+          <p:cNvSpPr txBox="1"/>
+          <p:nvPr/>
+        </p:nvSpPr>
+        <p:spPr>
+          <a:xfrm>
+            <a:off x="6170555" y="144725"/>
+            <a:ext cx="5262734" cy="3139321"/>
+          </a:xfrm>
+          <a:prstGeom prst="rect">
+            <a:avLst/>
+          </a:prstGeom>
+          <a:noFill/>
+        </p:spPr>
+        <p:txBody>
+          <a:bodyPr wrap="square" rtlCol="0">
+            <a:spAutoFit/>
+          </a:bodyPr>
+          <a:lstStyle/>
+          <a:p>
+            <a:r>
+              <a:rPr lang="fr-FR" dirty="0"/>
+              <a:t>Pas pins : 2mm</a:t>
+            </a:r>
+          </a:p>
+          <a:p>
+            <a:r>
+              <a:rPr lang="fr-FR" dirty="0"/>
+              <a:t>Pin : h = 9,6mm, l = 3mm</a:t>
+            </a:r>
+          </a:p>
+          <a:p>
+            <a:endParaRPr lang="fr-FR" dirty="0"/>
+          </a:p>
+          <a:p>
+            <a:r>
+              <a:rPr lang="fr-FR" dirty="0"/>
+              <a:t>(h) : L = 13,6</a:t>
+            </a:r>
+          </a:p>
+          <a:p>
+            <a:r>
+              <a:rPr lang="fr-FR" dirty="0"/>
+              <a:t>(e) : L = 18,6</a:t>
+            </a:r>
+          </a:p>
+          <a:p>
+            <a:r>
+              <a:rPr lang="fr-FR" dirty="0"/>
+              <a:t>(f) : L = 18,6</a:t>
+            </a:r>
+          </a:p>
+          <a:p>
+            <a:r>
+              <a:rPr lang="fr-FR" dirty="0"/>
+              <a:t>(g) : L = 23,6</a:t>
+            </a:r>
+          </a:p>
+          <a:p>
+            <a:endParaRPr lang="fr-FR" dirty="0"/>
+          </a:p>
+          <a:p>
+            <a:r>
+              <a:rPr lang="fr-FR" dirty="0"/>
+              <a:t>Distance entre connecteur coté pin : 3,2mm</a:t>
+            </a:r>
+          </a:p>
+          <a:p>
+            <a:endParaRPr lang="fr-FR" dirty="0"/>
+          </a:p>
+          <a:p>
+            <a:r>
+              <a:rPr lang="fr-FR" dirty="0"/>
+              <a:t>Distance bord 2mm</a:t>
+            </a:r>
+          </a:p>
+        </p:txBody>
+      </p:sp>
     </p:spTree>
     <p:extLst>
       <p:ext uri="{BB962C8B-B14F-4D97-AF65-F5344CB8AC3E}">
         <p14:creationId xmlns:p14="http://schemas.microsoft.com/office/powerpoint/2010/main" val="101195905"/>
+      </p:ext>
+    </p:extLst>
+  </p:cSld>
+  <p:clrMapOvr>
+    <a:masterClrMapping/>
+  </p:clrMapOvr>
+</p:sld>
+</file>
+
+<file path=ppt/slides/slide4.xml><?xml version="1.0" encoding="utf-8"?>
+<p:sld xmlns:a="http://schemas.openxmlformats.org/drawingml/2006/main" xmlns:r="http://schemas.openxmlformats.org/officeDocument/2006/relationships" xmlns:p="http://schemas.openxmlformats.org/presentationml/2006/main">
+  <p:cSld>
+    <p:spTree>
+      <p:nvGrpSpPr>
+        <p:cNvPr id="1" name=""/>
+        <p:cNvGrpSpPr/>
+        <p:nvPr/>
+      </p:nvGrpSpPr>
+      <p:grpSpPr>
+        <a:xfrm>
+          <a:off x="0" y="0"/>
+          <a:ext cx="0" cy="0"/>
+          <a:chOff x="0" y="0"/>
+          <a:chExt cx="0" cy="0"/>
+        </a:xfrm>
+      </p:grpSpPr>
+      <p:pic>
+        <p:nvPicPr>
+          <p:cNvPr id="5" name="Image 4" descr="Une image contenant texte, équipement électronique, circuit&#10;&#10;Description générée automatiquement">
+            <a:extLst>
+              <a:ext uri="{FF2B5EF4-FFF2-40B4-BE49-F238E27FC236}">
+                <a16:creationId xmlns:a16="http://schemas.microsoft.com/office/drawing/2014/main" id="{7536B2F2-A122-FF1D-9F0B-CFE5D54E5632}"/>
+              </a:ext>
+            </a:extLst>
+          </p:cNvPr>
+          <p:cNvPicPr>
+            <a:picLocks noChangeAspect="1"/>
+          </p:cNvPicPr>
+          <p:nvPr/>
+        </p:nvPicPr>
+        <p:blipFill rotWithShape="1">
+          <a:blip r:embed="rId2">
+            <a:extLst>
+              <a:ext uri="{28A0092B-C50C-407E-A947-70E740481C1C}">
+                <a14:useLocalDpi xmlns:a14="http://schemas.microsoft.com/office/drawing/2010/main" val="0"/>
+              </a:ext>
+            </a:extLst>
+          </a:blip>
+          <a:srcRect l="25723" t="42585" r="26150" b="15374"/>
+          <a:stretch/>
+        </p:blipFill>
+        <p:spPr>
+          <a:xfrm>
+            <a:off x="179999" y="1629549"/>
+            <a:ext cx="2164700" cy="3576968"/>
+          </a:xfrm>
+          <a:prstGeom prst="rect">
+            <a:avLst/>
+          </a:prstGeom>
+        </p:spPr>
+      </p:pic>
+      <p:pic>
+        <p:nvPicPr>
+          <p:cNvPr id="7" name="Image 6">
+            <a:extLst>
+              <a:ext uri="{FF2B5EF4-FFF2-40B4-BE49-F238E27FC236}">
+                <a16:creationId xmlns:a16="http://schemas.microsoft.com/office/drawing/2014/main" id="{A2659AE9-DDFD-C69F-5A5A-5872AA976BBA}"/>
+              </a:ext>
+            </a:extLst>
+          </p:cNvPr>
+          <p:cNvPicPr>
+            <a:picLocks noChangeAspect="1"/>
+          </p:cNvPicPr>
+          <p:nvPr/>
+        </p:nvPicPr>
+        <p:blipFill rotWithShape="1">
+          <a:blip r:embed="rId3">
+            <a:extLst>
+              <a:ext uri="{28A0092B-C50C-407E-A947-70E740481C1C}">
+                <a14:useLocalDpi xmlns:a14="http://schemas.microsoft.com/office/drawing/2010/main" val="0"/>
+              </a:ext>
+            </a:extLst>
+          </a:blip>
+          <a:srcRect l="40179" t="26476" r="4719" b="45098"/>
+          <a:stretch/>
+        </p:blipFill>
+        <p:spPr>
+          <a:xfrm>
+            <a:off x="-263885" y="80473"/>
+            <a:ext cx="4516017" cy="1231607"/>
+          </a:xfrm>
+          <a:prstGeom prst="rect">
+            <a:avLst/>
+          </a:prstGeom>
+        </p:spPr>
+      </p:pic>
+      <p:graphicFrame>
+        <p:nvGraphicFramePr>
+          <p:cNvPr id="8" name="Tableau 8">
+            <a:extLst>
+              <a:ext uri="{FF2B5EF4-FFF2-40B4-BE49-F238E27FC236}">
+                <a16:creationId xmlns:a16="http://schemas.microsoft.com/office/drawing/2014/main" id="{D89D32E5-94FD-8363-B1A2-2C53B3A6D8F8}"/>
+              </a:ext>
+            </a:extLst>
+          </p:cNvPr>
+          <p:cNvGraphicFramePr>
+            <a:graphicFrameLocks noGrp="1"/>
+          </p:cNvGraphicFramePr>
+          <p:nvPr>
+            <p:extLst>
+              <p:ext uri="{D42A27DB-BD31-4B8C-83A1-F6EECF244321}">
+                <p14:modId xmlns:p14="http://schemas.microsoft.com/office/powerpoint/2010/main" val="4005846019"/>
+              </p:ext>
+            </p:extLst>
+          </p:nvPr>
+        </p:nvGraphicFramePr>
+        <p:xfrm>
+          <a:off x="4421080" y="80473"/>
+          <a:ext cx="7674251" cy="5562600"/>
+        </p:xfrm>
+        <a:graphic>
+          <a:graphicData uri="http://schemas.openxmlformats.org/drawingml/2006/table">
+            <a:tbl>
+              <a:tblPr firstRow="1" bandRow="1">
+                <a:tableStyleId>{5C22544A-7EE6-4342-B048-85BDC9FD1C3A}</a:tableStyleId>
+              </a:tblPr>
+              <a:tblGrid>
+                <a:gridCol w="1056442">
+                  <a:extLst>
+                    <a:ext uri="{9D8B030D-6E8A-4147-A177-3AD203B41FA5}">
+                      <a16:colId xmlns:a16="http://schemas.microsoft.com/office/drawing/2014/main" val="1710672165"/>
+                    </a:ext>
+                  </a:extLst>
+                </a:gridCol>
+                <a:gridCol w="4065934">
+                  <a:extLst>
+                    <a:ext uri="{9D8B030D-6E8A-4147-A177-3AD203B41FA5}">
+                      <a16:colId xmlns:a16="http://schemas.microsoft.com/office/drawing/2014/main" val="425259042"/>
+                    </a:ext>
+                  </a:extLst>
+                </a:gridCol>
+                <a:gridCol w="1466863">
+                  <a:extLst>
+                    <a:ext uri="{9D8B030D-6E8A-4147-A177-3AD203B41FA5}">
+                      <a16:colId xmlns:a16="http://schemas.microsoft.com/office/drawing/2014/main" val="2420665567"/>
+                    </a:ext>
+                  </a:extLst>
+                </a:gridCol>
+                <a:gridCol w="1085012">
+                  <a:extLst>
+                    <a:ext uri="{9D8B030D-6E8A-4147-A177-3AD203B41FA5}">
+                      <a16:colId xmlns:a16="http://schemas.microsoft.com/office/drawing/2014/main" val="1206820935"/>
+                    </a:ext>
+                  </a:extLst>
+                </a:gridCol>
+              </a:tblGrid>
+              <a:tr h="370840">
+                <a:tc>
+                  <a:txBody>
+                    <a:bodyPr/>
+                    <a:lstStyle/>
+                    <a:p>
+                      <a:pPr algn="ctr"/>
+                      <a:r>
+                        <a:rPr lang="fr-FR" sz="1400" dirty="0"/>
+                        <a:t>Repère</a:t>
+                      </a:r>
+                    </a:p>
+                  </a:txBody>
+                  <a:tcPr anchor="ctr"/>
+                </a:tc>
+                <a:tc gridSpan="2">
+                  <a:txBody>
+                    <a:bodyPr/>
+                    <a:lstStyle/>
+                    <a:p>
+                      <a:pPr algn="ctr"/>
+                      <a:r>
+                        <a:rPr lang="fr-FR" sz="1400" dirty="0"/>
+                        <a:t>Elément </a:t>
+                      </a:r>
+                    </a:p>
+                  </a:txBody>
+                  <a:tcPr anchor="ctr"/>
+                </a:tc>
+                <a:tc hMerge="1">
+                  <a:txBody>
+                    <a:bodyPr/>
+                    <a:lstStyle/>
+                    <a:p>
+                      <a:endParaRPr lang="fr-FR" dirty="0"/>
+                    </a:p>
+                  </a:txBody>
+                  <a:tcPr/>
+                </a:tc>
+                <a:tc>
+                  <a:txBody>
+                    <a:bodyPr/>
+                    <a:lstStyle/>
+                    <a:p>
+                      <a:pPr algn="ctr"/>
+                      <a:r>
+                        <a:rPr lang="fr-FR" sz="1400" dirty="0"/>
+                        <a:t>Dim. [mm]</a:t>
+                      </a:r>
+                    </a:p>
+                  </a:txBody>
+                  <a:tcPr anchor="ctr"/>
+                </a:tc>
+                <a:extLst>
+                  <a:ext uri="{0D108BD9-81ED-4DB2-BD59-A6C34878D82A}">
+                    <a16:rowId xmlns:a16="http://schemas.microsoft.com/office/drawing/2014/main" val="1245839283"/>
+                  </a:ext>
+                </a:extLst>
+              </a:tr>
+              <a:tr h="370840">
+                <a:tc rowSpan="3">
+                  <a:txBody>
+                    <a:bodyPr/>
+                    <a:lstStyle/>
+                    <a:p>
+                      <a:pPr algn="ctr"/>
+                      <a:endParaRPr lang="fr-FR" sz="1200" dirty="0"/>
+                    </a:p>
+                  </a:txBody>
+                  <a:tcPr anchor="ctr">
+                    <a:solidFill>
+                      <a:schemeClr val="bg2"/>
+                    </a:solidFill>
+                  </a:tcPr>
+                </a:tc>
+                <a:tc rowSpan="3">
+                  <a:txBody>
+                    <a:bodyPr/>
+                    <a:lstStyle/>
+                    <a:p>
+                      <a:r>
+                        <a:rPr lang="fr-FR" sz="1200" dirty="0"/>
+                        <a:t>Dimension carte</a:t>
+                      </a:r>
+                    </a:p>
+                  </a:txBody>
+                  <a:tcPr anchor="ctr">
+                    <a:solidFill>
+                      <a:schemeClr val="bg2"/>
+                    </a:solidFill>
+                  </a:tcPr>
+                </a:tc>
+                <a:tc>
+                  <a:txBody>
+                    <a:bodyPr/>
+                    <a:lstStyle/>
+                    <a:p>
+                      <a:r>
+                        <a:rPr lang="fr-FR" sz="1200" dirty="0"/>
+                        <a:t>Longueur</a:t>
+                      </a:r>
+                    </a:p>
+                  </a:txBody>
+                  <a:tcPr anchor="ctr">
+                    <a:solidFill>
+                      <a:schemeClr val="bg2"/>
+                    </a:solidFill>
+                  </a:tcPr>
+                </a:tc>
+                <a:tc>
+                  <a:txBody>
+                    <a:bodyPr/>
+                    <a:lstStyle/>
+                    <a:p>
+                      <a:r>
+                        <a:rPr lang="fr-FR" sz="1200" dirty="0"/>
+                        <a:t>70,1</a:t>
+                      </a:r>
+                    </a:p>
+                  </a:txBody>
+                  <a:tcPr>
+                    <a:solidFill>
+                      <a:schemeClr val="bg2"/>
+                    </a:solidFill>
+                  </a:tcPr>
+                </a:tc>
+                <a:extLst>
+                  <a:ext uri="{0D108BD9-81ED-4DB2-BD59-A6C34878D82A}">
+                    <a16:rowId xmlns:a16="http://schemas.microsoft.com/office/drawing/2014/main" val="1747829981"/>
+                  </a:ext>
+                </a:extLst>
+              </a:tr>
+              <a:tr h="370840">
+                <a:tc vMerge="1">
+                  <a:txBody>
+                    <a:bodyPr/>
+                    <a:lstStyle/>
+                    <a:p>
+                      <a:endParaRPr lang="fr-FR" sz="1200" dirty="0"/>
+                    </a:p>
+                  </a:txBody>
+                  <a:tcPr>
+                    <a:solidFill>
+                      <a:schemeClr val="bg2"/>
+                    </a:solidFill>
+                  </a:tcPr>
+                </a:tc>
+                <a:tc vMerge="1">
+                  <a:txBody>
+                    <a:bodyPr/>
+                    <a:lstStyle/>
+                    <a:p>
+                      <a:endParaRPr lang="fr-FR" sz="1200" dirty="0"/>
+                    </a:p>
+                  </a:txBody>
+                  <a:tcPr anchor="ctr">
+                    <a:solidFill>
+                      <a:schemeClr val="bg2"/>
+                    </a:solidFill>
+                  </a:tcPr>
+                </a:tc>
+                <a:tc>
+                  <a:txBody>
+                    <a:bodyPr/>
+                    <a:lstStyle/>
+                    <a:p>
+                      <a:r>
+                        <a:rPr lang="fr-FR" sz="1200" dirty="0"/>
+                        <a:t>Largeur</a:t>
+                      </a:r>
+                    </a:p>
+                  </a:txBody>
+                  <a:tcPr anchor="ctr">
+                    <a:solidFill>
+                      <a:schemeClr val="bg2"/>
+                    </a:solidFill>
+                  </a:tcPr>
+                </a:tc>
+                <a:tc>
+                  <a:txBody>
+                    <a:bodyPr/>
+                    <a:lstStyle/>
+                    <a:p>
+                      <a:r>
+                        <a:rPr lang="fr-FR" sz="1200" dirty="0"/>
+                        <a:t>34,5</a:t>
+                      </a:r>
+                    </a:p>
+                  </a:txBody>
+                  <a:tcPr>
+                    <a:solidFill>
+                      <a:schemeClr val="bg2"/>
+                    </a:solidFill>
+                  </a:tcPr>
+                </a:tc>
+                <a:extLst>
+                  <a:ext uri="{0D108BD9-81ED-4DB2-BD59-A6C34878D82A}">
+                    <a16:rowId xmlns:a16="http://schemas.microsoft.com/office/drawing/2014/main" val="3918008707"/>
+                  </a:ext>
+                </a:extLst>
+              </a:tr>
+              <a:tr h="370840">
+                <a:tc vMerge="1">
+                  <a:txBody>
+                    <a:bodyPr/>
+                    <a:lstStyle/>
+                    <a:p>
+                      <a:endParaRPr lang="fr-FR" sz="1200" dirty="0"/>
+                    </a:p>
+                  </a:txBody>
+                  <a:tcPr>
+                    <a:solidFill>
+                      <a:schemeClr val="bg2"/>
+                    </a:solidFill>
+                  </a:tcPr>
+                </a:tc>
+                <a:tc vMerge="1">
+                  <a:txBody>
+                    <a:bodyPr/>
+                    <a:lstStyle/>
+                    <a:p>
+                      <a:endParaRPr lang="fr-FR" sz="1200" dirty="0"/>
+                    </a:p>
+                  </a:txBody>
+                  <a:tcPr anchor="ctr">
+                    <a:solidFill>
+                      <a:schemeClr val="bg2"/>
+                    </a:solidFill>
+                  </a:tcPr>
+                </a:tc>
+                <a:tc>
+                  <a:txBody>
+                    <a:bodyPr/>
+                    <a:lstStyle/>
+                    <a:p>
+                      <a:r>
+                        <a:rPr lang="fr-FR" sz="1200" dirty="0"/>
+                        <a:t>Epaisseur</a:t>
+                      </a:r>
+                    </a:p>
+                  </a:txBody>
+                  <a:tcPr anchor="ctr">
+                    <a:solidFill>
+                      <a:schemeClr val="bg2"/>
+                    </a:solidFill>
+                  </a:tcPr>
+                </a:tc>
+                <a:tc>
+                  <a:txBody>
+                    <a:bodyPr/>
+                    <a:lstStyle/>
+                    <a:p>
+                      <a:r>
+                        <a:rPr lang="fr-FR" sz="1200"/>
+                        <a:t>1,46</a:t>
+                      </a:r>
+                      <a:endParaRPr lang="fr-FR" sz="1200" dirty="0"/>
+                    </a:p>
+                  </a:txBody>
+                  <a:tcPr>
+                    <a:solidFill>
+                      <a:schemeClr val="bg2"/>
+                    </a:solidFill>
+                  </a:tcPr>
+                </a:tc>
+                <a:extLst>
+                  <a:ext uri="{0D108BD9-81ED-4DB2-BD59-A6C34878D82A}">
+                    <a16:rowId xmlns:a16="http://schemas.microsoft.com/office/drawing/2014/main" val="3891473421"/>
+                  </a:ext>
+                </a:extLst>
+              </a:tr>
+              <a:tr h="370840">
+                <a:tc>
+                  <a:txBody>
+                    <a:bodyPr/>
+                    <a:lstStyle/>
+                    <a:p>
+                      <a:pPr algn="ctr"/>
+                      <a:r>
+                        <a:rPr lang="fr-FR" sz="1200" dirty="0"/>
+                        <a:t>A</a:t>
+                      </a:r>
+                    </a:p>
+                  </a:txBody>
+                  <a:tcPr anchor="ctr">
+                    <a:solidFill>
+                      <a:schemeClr val="bg2"/>
+                    </a:solidFill>
+                  </a:tcPr>
+                </a:tc>
+                <a:tc>
+                  <a:txBody>
+                    <a:bodyPr/>
+                    <a:lstStyle/>
+                    <a:p>
+                      <a:endParaRPr lang="fr-FR" sz="1200" dirty="0"/>
+                    </a:p>
+                  </a:txBody>
+                  <a:tcPr anchor="ctr">
+                    <a:solidFill>
+                      <a:schemeClr val="bg2"/>
+                    </a:solidFill>
+                  </a:tcPr>
+                </a:tc>
+                <a:tc>
+                  <a:txBody>
+                    <a:bodyPr/>
+                    <a:lstStyle/>
+                    <a:p>
+                      <a:r>
+                        <a:rPr lang="fr-FR" sz="1200" dirty="0"/>
+                        <a:t>Distance</a:t>
+                      </a:r>
+                    </a:p>
+                  </a:txBody>
+                  <a:tcPr anchor="ctr">
+                    <a:solidFill>
+                      <a:schemeClr val="bg2"/>
+                    </a:solidFill>
+                  </a:tcPr>
+                </a:tc>
+                <a:tc>
+                  <a:txBody>
+                    <a:bodyPr/>
+                    <a:lstStyle/>
+                    <a:p>
+                      <a:r>
+                        <a:rPr lang="fr-FR" sz="1200" dirty="0"/>
+                        <a:t>8,5</a:t>
+                      </a:r>
+                    </a:p>
+                  </a:txBody>
+                  <a:tcPr>
+                    <a:solidFill>
+                      <a:schemeClr val="bg2"/>
+                    </a:solidFill>
+                  </a:tcPr>
+                </a:tc>
+                <a:extLst>
+                  <a:ext uri="{0D108BD9-81ED-4DB2-BD59-A6C34878D82A}">
+                    <a16:rowId xmlns:a16="http://schemas.microsoft.com/office/drawing/2014/main" val="1156215911"/>
+                  </a:ext>
+                </a:extLst>
+              </a:tr>
+              <a:tr h="370840">
+                <a:tc>
+                  <a:txBody>
+                    <a:bodyPr/>
+                    <a:lstStyle/>
+                    <a:p>
+                      <a:pPr algn="ctr"/>
+                      <a:r>
+                        <a:rPr lang="fr-FR" sz="1200" dirty="0"/>
+                        <a:t>B</a:t>
+                      </a:r>
+                    </a:p>
+                  </a:txBody>
+                  <a:tcPr anchor="ctr">
+                    <a:solidFill>
+                      <a:schemeClr val="bg2"/>
+                    </a:solidFill>
+                  </a:tcPr>
+                </a:tc>
+                <a:tc>
+                  <a:txBody>
+                    <a:bodyPr/>
+                    <a:lstStyle/>
+                    <a:p>
+                      <a:endParaRPr lang="fr-FR" sz="1200" dirty="0"/>
+                    </a:p>
+                  </a:txBody>
+                  <a:tcPr anchor="ctr">
+                    <a:solidFill>
+                      <a:schemeClr val="bg2"/>
+                    </a:solidFill>
+                  </a:tcPr>
+                </a:tc>
+                <a:tc>
+                  <a:txBody>
+                    <a:bodyPr/>
+                    <a:lstStyle/>
+                    <a:p>
+                      <a:r>
+                        <a:rPr lang="fr-FR" sz="1200"/>
+                        <a:t>Distance </a:t>
+                      </a:r>
+                      <a:endParaRPr lang="fr-FR" sz="1200" dirty="0"/>
+                    </a:p>
+                  </a:txBody>
+                  <a:tcPr anchor="ctr">
+                    <a:solidFill>
+                      <a:schemeClr val="bg2"/>
+                    </a:solidFill>
+                  </a:tcPr>
+                </a:tc>
+                <a:tc>
+                  <a:txBody>
+                    <a:bodyPr/>
+                    <a:lstStyle/>
+                    <a:p>
+                      <a:r>
+                        <a:rPr lang="fr-FR" sz="1200" dirty="0"/>
+                        <a:t>5,5</a:t>
+                      </a:r>
+                    </a:p>
+                  </a:txBody>
+                  <a:tcPr>
+                    <a:solidFill>
+                      <a:schemeClr val="bg2"/>
+                    </a:solidFill>
+                  </a:tcPr>
+                </a:tc>
+                <a:extLst>
+                  <a:ext uri="{0D108BD9-81ED-4DB2-BD59-A6C34878D82A}">
+                    <a16:rowId xmlns:a16="http://schemas.microsoft.com/office/drawing/2014/main" val="220634229"/>
+                  </a:ext>
+                </a:extLst>
+              </a:tr>
+              <a:tr h="370840">
+                <a:tc>
+                  <a:txBody>
+                    <a:bodyPr/>
+                    <a:lstStyle/>
+                    <a:p>
+                      <a:pPr algn="ctr"/>
+                      <a:r>
+                        <a:rPr lang="fr-FR" sz="1200" dirty="0"/>
+                        <a:t>C</a:t>
+                      </a:r>
+                    </a:p>
+                  </a:txBody>
+                  <a:tcPr anchor="ctr">
+                    <a:solidFill>
+                      <a:schemeClr val="bg2"/>
+                    </a:solidFill>
+                  </a:tcPr>
+                </a:tc>
+                <a:tc>
+                  <a:txBody>
+                    <a:bodyPr/>
+                    <a:lstStyle/>
+                    <a:p>
+                      <a:endParaRPr lang="fr-FR" sz="1200" dirty="0"/>
+                    </a:p>
+                  </a:txBody>
+                  <a:tcPr anchor="ctr">
+                    <a:solidFill>
+                      <a:schemeClr val="bg2"/>
+                    </a:solidFill>
+                  </a:tcPr>
+                </a:tc>
+                <a:tc>
+                  <a:txBody>
+                    <a:bodyPr/>
+                    <a:lstStyle/>
+                    <a:p>
+                      <a:endParaRPr lang="fr-FR" sz="1200" dirty="0"/>
+                    </a:p>
+                  </a:txBody>
+                  <a:tcPr anchor="ctr">
+                    <a:solidFill>
+                      <a:schemeClr val="bg2"/>
+                    </a:solidFill>
+                  </a:tcPr>
+                </a:tc>
+                <a:tc>
+                  <a:txBody>
+                    <a:bodyPr/>
+                    <a:lstStyle/>
+                    <a:p>
+                      <a:r>
+                        <a:rPr lang="fr-FR" sz="1200" dirty="0"/>
+                        <a:t>2,2</a:t>
+                      </a:r>
+                    </a:p>
+                  </a:txBody>
+                  <a:tcPr>
+                    <a:solidFill>
+                      <a:schemeClr val="bg2"/>
+                    </a:solidFill>
+                  </a:tcPr>
+                </a:tc>
+                <a:extLst>
+                  <a:ext uri="{0D108BD9-81ED-4DB2-BD59-A6C34878D82A}">
+                    <a16:rowId xmlns:a16="http://schemas.microsoft.com/office/drawing/2014/main" val="115775106"/>
+                  </a:ext>
+                </a:extLst>
+              </a:tr>
+              <a:tr h="370840">
+                <a:tc>
+                  <a:txBody>
+                    <a:bodyPr/>
+                    <a:lstStyle/>
+                    <a:p>
+                      <a:pPr algn="ctr"/>
+                      <a:r>
+                        <a:rPr lang="fr-FR" sz="1200" dirty="0"/>
+                        <a:t>D</a:t>
+                      </a:r>
+                    </a:p>
+                  </a:txBody>
+                  <a:tcPr anchor="ctr">
+                    <a:solidFill>
+                      <a:schemeClr val="bg2"/>
+                    </a:solidFill>
+                  </a:tcPr>
+                </a:tc>
+                <a:tc>
+                  <a:txBody>
+                    <a:bodyPr/>
+                    <a:lstStyle/>
+                    <a:p>
+                      <a:endParaRPr lang="fr-FR" sz="1200" dirty="0"/>
+                    </a:p>
+                  </a:txBody>
+                  <a:tcPr anchor="ctr">
+                    <a:solidFill>
+                      <a:schemeClr val="bg2"/>
+                    </a:solidFill>
+                  </a:tcPr>
+                </a:tc>
+                <a:tc>
+                  <a:txBody>
+                    <a:bodyPr/>
+                    <a:lstStyle/>
+                    <a:p>
+                      <a:endParaRPr lang="fr-FR" sz="1200" dirty="0"/>
+                    </a:p>
+                  </a:txBody>
+                  <a:tcPr anchor="ctr">
+                    <a:solidFill>
+                      <a:schemeClr val="bg2"/>
+                    </a:solidFill>
+                  </a:tcPr>
+                </a:tc>
+                <a:tc>
+                  <a:txBody>
+                    <a:bodyPr/>
+                    <a:lstStyle/>
+                    <a:p>
+                      <a:r>
+                        <a:rPr lang="fr-FR" sz="1200" dirty="0"/>
+                        <a:t>19,5</a:t>
+                      </a:r>
+                    </a:p>
+                  </a:txBody>
+                  <a:tcPr>
+                    <a:solidFill>
+                      <a:schemeClr val="bg2"/>
+                    </a:solidFill>
+                  </a:tcPr>
+                </a:tc>
+                <a:extLst>
+                  <a:ext uri="{0D108BD9-81ED-4DB2-BD59-A6C34878D82A}">
+                    <a16:rowId xmlns:a16="http://schemas.microsoft.com/office/drawing/2014/main" val="3148011849"/>
+                  </a:ext>
+                </a:extLst>
+              </a:tr>
+              <a:tr h="370840">
+                <a:tc rowSpan="3">
+                  <a:txBody>
+                    <a:bodyPr/>
+                    <a:lstStyle/>
+                    <a:p>
+                      <a:pPr algn="ctr"/>
+                      <a:r>
+                        <a:rPr lang="fr-FR" sz="1200" dirty="0"/>
+                        <a:t>AA</a:t>
+                      </a:r>
+                    </a:p>
+                  </a:txBody>
+                  <a:tcPr anchor="ctr">
+                    <a:solidFill>
+                      <a:schemeClr val="bg2"/>
+                    </a:solidFill>
+                  </a:tcPr>
+                </a:tc>
+                <a:tc>
+                  <a:txBody>
+                    <a:bodyPr/>
+                    <a:lstStyle/>
+                    <a:p>
+                      <a:r>
+                        <a:rPr lang="fr-FR" sz="1200" dirty="0"/>
+                        <a:t>Dimension des pins </a:t>
+                      </a:r>
+                    </a:p>
+                  </a:txBody>
+                  <a:tcPr anchor="ctr">
+                    <a:solidFill>
+                      <a:schemeClr val="bg2"/>
+                    </a:solidFill>
+                  </a:tcPr>
+                </a:tc>
+                <a:tc>
+                  <a:txBody>
+                    <a:bodyPr/>
+                    <a:lstStyle/>
+                    <a:p>
+                      <a:r>
+                        <a:rPr lang="fr-FR" sz="1200" dirty="0"/>
+                        <a:t>Longueur</a:t>
+                      </a:r>
+                    </a:p>
+                  </a:txBody>
+                  <a:tcPr anchor="ctr">
+                    <a:solidFill>
+                      <a:schemeClr val="bg2"/>
+                    </a:solidFill>
+                  </a:tcPr>
+                </a:tc>
+                <a:tc>
+                  <a:txBody>
+                    <a:bodyPr/>
+                    <a:lstStyle/>
+                    <a:p>
+                      <a:r>
+                        <a:rPr lang="fr-FR" sz="1200" dirty="0"/>
+                        <a:t>10</a:t>
+                      </a:r>
+                    </a:p>
+                  </a:txBody>
+                  <a:tcPr>
+                    <a:solidFill>
+                      <a:schemeClr val="bg2"/>
+                    </a:solidFill>
+                  </a:tcPr>
+                </a:tc>
+                <a:extLst>
+                  <a:ext uri="{0D108BD9-81ED-4DB2-BD59-A6C34878D82A}">
+                    <a16:rowId xmlns:a16="http://schemas.microsoft.com/office/drawing/2014/main" val="3242694623"/>
+                  </a:ext>
+                </a:extLst>
+              </a:tr>
+              <a:tr h="370840">
+                <a:tc vMerge="1">
+                  <a:txBody>
+                    <a:bodyPr/>
+                    <a:lstStyle/>
+                    <a:p>
+                      <a:endParaRPr lang="fr-FR" sz="1200" dirty="0"/>
+                    </a:p>
+                  </a:txBody>
+                  <a:tcPr>
+                    <a:solidFill>
+                      <a:schemeClr val="bg2"/>
+                    </a:solidFill>
+                  </a:tcPr>
+                </a:tc>
+                <a:tc>
+                  <a:txBody>
+                    <a:bodyPr/>
+                    <a:lstStyle/>
+                    <a:p>
+                      <a:endParaRPr lang="fr-FR" sz="1200" dirty="0"/>
+                    </a:p>
+                  </a:txBody>
+                  <a:tcPr anchor="ctr">
+                    <a:solidFill>
+                      <a:schemeClr val="bg2"/>
+                    </a:solidFill>
+                  </a:tcPr>
+                </a:tc>
+                <a:tc>
+                  <a:txBody>
+                    <a:bodyPr/>
+                    <a:lstStyle/>
+                    <a:p>
+                      <a:r>
+                        <a:rPr lang="fr-FR" sz="1200" dirty="0"/>
+                        <a:t>Largeur</a:t>
+                      </a:r>
+                    </a:p>
+                  </a:txBody>
+                  <a:tcPr anchor="ctr">
+                    <a:solidFill>
+                      <a:schemeClr val="bg2"/>
+                    </a:solidFill>
+                  </a:tcPr>
+                </a:tc>
+                <a:tc>
+                  <a:txBody>
+                    <a:bodyPr/>
+                    <a:lstStyle/>
+                    <a:p>
+                      <a:r>
+                        <a:rPr lang="fr-FR" sz="1200" dirty="0"/>
+                        <a:t>2,3</a:t>
+                      </a:r>
+                    </a:p>
+                  </a:txBody>
+                  <a:tcPr>
+                    <a:solidFill>
+                      <a:schemeClr val="bg2"/>
+                    </a:solidFill>
+                  </a:tcPr>
+                </a:tc>
+                <a:extLst>
+                  <a:ext uri="{0D108BD9-81ED-4DB2-BD59-A6C34878D82A}">
+                    <a16:rowId xmlns:a16="http://schemas.microsoft.com/office/drawing/2014/main" val="3732324758"/>
+                  </a:ext>
+                </a:extLst>
+              </a:tr>
+              <a:tr h="370840">
+                <a:tc vMerge="1">
+                  <a:txBody>
+                    <a:bodyPr/>
+                    <a:lstStyle/>
+                    <a:p>
+                      <a:endParaRPr lang="fr-FR" sz="1200" dirty="0"/>
+                    </a:p>
+                  </a:txBody>
+                  <a:tcPr>
+                    <a:solidFill>
+                      <a:schemeClr val="bg2"/>
+                    </a:solidFill>
+                  </a:tcPr>
+                </a:tc>
+                <a:tc>
+                  <a:txBody>
+                    <a:bodyPr/>
+                    <a:lstStyle/>
+                    <a:p>
+                      <a:r>
+                        <a:rPr lang="fr-FR" sz="1200" dirty="0"/>
+                        <a:t>      (avec épaisseur de carte + soudure)</a:t>
+                      </a:r>
+                    </a:p>
+                  </a:txBody>
+                  <a:tcPr anchor="ctr">
+                    <a:solidFill>
+                      <a:schemeClr val="bg2"/>
+                    </a:solidFill>
+                  </a:tcPr>
+                </a:tc>
+                <a:tc>
+                  <a:txBody>
+                    <a:bodyPr/>
+                    <a:lstStyle/>
+                    <a:p>
+                      <a:r>
+                        <a:rPr lang="fr-FR" sz="1200" dirty="0"/>
+                        <a:t>Hauteur</a:t>
+                      </a:r>
+                    </a:p>
+                  </a:txBody>
+                  <a:tcPr anchor="ctr">
+                    <a:solidFill>
+                      <a:schemeClr val="bg2"/>
+                    </a:solidFill>
+                  </a:tcPr>
+                </a:tc>
+                <a:tc>
+                  <a:txBody>
+                    <a:bodyPr/>
+                    <a:lstStyle/>
+                    <a:p>
+                      <a:r>
+                        <a:rPr lang="fr-FR" sz="1200" dirty="0"/>
+                        <a:t>6,5</a:t>
+                      </a:r>
+                    </a:p>
+                  </a:txBody>
+                  <a:tcPr>
+                    <a:solidFill>
+                      <a:schemeClr val="bg2"/>
+                    </a:solidFill>
+                  </a:tcPr>
+                </a:tc>
+                <a:extLst>
+                  <a:ext uri="{0D108BD9-81ED-4DB2-BD59-A6C34878D82A}">
+                    <a16:rowId xmlns:a16="http://schemas.microsoft.com/office/drawing/2014/main" val="1270276852"/>
+                  </a:ext>
+                </a:extLst>
+              </a:tr>
+              <a:tr h="370840">
+                <a:tc>
+                  <a:txBody>
+                    <a:bodyPr/>
+                    <a:lstStyle/>
+                    <a:p>
+                      <a:pPr algn="ctr"/>
+                      <a:r>
+                        <a:rPr lang="fr-FR" sz="1200" dirty="0"/>
+                        <a:t>E</a:t>
+                      </a:r>
+                    </a:p>
+                  </a:txBody>
+                  <a:tcPr anchor="ctr">
+                    <a:solidFill>
+                      <a:schemeClr val="bg2"/>
+                    </a:solidFill>
+                  </a:tcPr>
+                </a:tc>
+                <a:tc>
+                  <a:txBody>
+                    <a:bodyPr/>
+                    <a:lstStyle/>
+                    <a:p>
+                      <a:r>
+                        <a:rPr lang="fr-FR" sz="1200" dirty="0"/>
+                        <a:t>Débordement board antenne sur board </a:t>
+                      </a:r>
+                      <a:r>
+                        <a:rPr lang="fr-FR" sz="1200" dirty="0" err="1"/>
+                        <a:t>Princ</a:t>
+                      </a:r>
+                      <a:r>
+                        <a:rPr lang="fr-FR" sz="1200" dirty="0"/>
+                        <a:t>.</a:t>
+                      </a:r>
+                    </a:p>
+                  </a:txBody>
+                  <a:tcPr anchor="ctr">
+                    <a:solidFill>
+                      <a:schemeClr val="bg2"/>
+                    </a:solidFill>
+                  </a:tcPr>
+                </a:tc>
+                <a:tc>
+                  <a:txBody>
+                    <a:bodyPr/>
+                    <a:lstStyle/>
+                    <a:p>
+                      <a:r>
+                        <a:rPr lang="fr-FR" sz="1200" dirty="0"/>
+                        <a:t>Distance</a:t>
+                      </a:r>
+                    </a:p>
+                  </a:txBody>
+                  <a:tcPr anchor="ctr">
+                    <a:solidFill>
+                      <a:schemeClr val="bg2"/>
+                    </a:solidFill>
+                  </a:tcPr>
+                </a:tc>
+                <a:tc>
+                  <a:txBody>
+                    <a:bodyPr/>
+                    <a:lstStyle/>
+                    <a:p>
+                      <a:r>
+                        <a:rPr lang="fr-FR" sz="1200" dirty="0"/>
+                        <a:t>~18,5</a:t>
+                      </a:r>
+                    </a:p>
+                  </a:txBody>
+                  <a:tcPr>
+                    <a:solidFill>
+                      <a:schemeClr val="bg2"/>
+                    </a:solidFill>
+                  </a:tcPr>
+                </a:tc>
+                <a:extLst>
+                  <a:ext uri="{0D108BD9-81ED-4DB2-BD59-A6C34878D82A}">
+                    <a16:rowId xmlns:a16="http://schemas.microsoft.com/office/drawing/2014/main" val="2584285303"/>
+                  </a:ext>
+                </a:extLst>
+              </a:tr>
+              <a:tr h="370840">
+                <a:tc>
+                  <a:txBody>
+                    <a:bodyPr/>
+                    <a:lstStyle/>
+                    <a:p>
+                      <a:pPr algn="ctr"/>
+                      <a:r>
+                        <a:rPr lang="fr-FR" sz="1200" dirty="0"/>
+                        <a:t>F</a:t>
+                      </a:r>
+                    </a:p>
+                  </a:txBody>
+                  <a:tcPr anchor="ctr">
+                    <a:solidFill>
+                      <a:schemeClr val="bg2"/>
+                    </a:solidFill>
+                  </a:tcPr>
+                </a:tc>
+                <a:tc>
+                  <a:txBody>
+                    <a:bodyPr/>
+                    <a:lstStyle/>
+                    <a:p>
+                      <a:r>
+                        <a:rPr lang="fr-FR" sz="1200" dirty="0"/>
+                        <a:t>Distance entre con (a) et bord de carte (avec </a:t>
+                      </a:r>
+                      <a:r>
+                        <a:rPr lang="fr-FR" sz="1200" dirty="0" err="1"/>
+                        <a:t>epaisseur</a:t>
+                      </a:r>
+                      <a:r>
+                        <a:rPr lang="fr-FR" sz="1200" dirty="0"/>
+                        <a:t> con)</a:t>
+                      </a:r>
+                    </a:p>
+                  </a:txBody>
+                  <a:tcPr anchor="ctr">
+                    <a:solidFill>
+                      <a:schemeClr val="bg2"/>
+                    </a:solidFill>
+                  </a:tcPr>
+                </a:tc>
+                <a:tc>
+                  <a:txBody>
+                    <a:bodyPr/>
+                    <a:lstStyle/>
+                    <a:p>
+                      <a:r>
+                        <a:rPr lang="fr-FR" sz="1200" dirty="0"/>
+                        <a:t>Distance</a:t>
+                      </a:r>
+                    </a:p>
+                  </a:txBody>
+                  <a:tcPr anchor="ctr">
+                    <a:solidFill>
+                      <a:schemeClr val="bg2"/>
+                    </a:solidFill>
+                  </a:tcPr>
+                </a:tc>
+                <a:tc>
+                  <a:txBody>
+                    <a:bodyPr/>
+                    <a:lstStyle/>
+                    <a:p>
+                      <a:r>
+                        <a:rPr lang="fr-FR" sz="1200" dirty="0"/>
+                        <a:t>3,3</a:t>
+                      </a:r>
+                    </a:p>
+                  </a:txBody>
+                  <a:tcPr>
+                    <a:solidFill>
+                      <a:schemeClr val="bg2"/>
+                    </a:solidFill>
+                  </a:tcPr>
+                </a:tc>
+                <a:extLst>
+                  <a:ext uri="{0D108BD9-81ED-4DB2-BD59-A6C34878D82A}">
+                    <a16:rowId xmlns:a16="http://schemas.microsoft.com/office/drawing/2014/main" val="444933833"/>
+                  </a:ext>
+                </a:extLst>
+              </a:tr>
+              <a:tr h="370840">
+                <a:tc>
+                  <a:txBody>
+                    <a:bodyPr/>
+                    <a:lstStyle/>
+                    <a:p>
+                      <a:pPr algn="ctr"/>
+                      <a:r>
+                        <a:rPr lang="fr-FR" sz="1200" dirty="0"/>
+                        <a:t>G</a:t>
+                      </a:r>
+                    </a:p>
+                  </a:txBody>
+                  <a:tcPr anchor="ctr">
+                    <a:solidFill>
+                      <a:schemeClr val="bg2"/>
+                    </a:solidFill>
+                  </a:tcPr>
+                </a:tc>
+                <a:tc>
+                  <a:txBody>
+                    <a:bodyPr/>
+                    <a:lstStyle/>
+                    <a:p>
+                      <a:r>
+                        <a:rPr lang="fr-FR" sz="1200" dirty="0"/>
+                        <a:t>Distance entre con (b) et bord de carte sup. (sans </a:t>
+                      </a:r>
+                      <a:r>
+                        <a:rPr lang="fr-FR" sz="1200" dirty="0" err="1"/>
+                        <a:t>ep</a:t>
+                      </a:r>
+                      <a:r>
+                        <a:rPr lang="fr-FR" sz="1200" dirty="0"/>
+                        <a:t>. Con)</a:t>
+                      </a:r>
+                    </a:p>
+                  </a:txBody>
+                  <a:tcPr anchor="ctr">
+                    <a:solidFill>
+                      <a:schemeClr val="bg2"/>
+                    </a:solidFill>
+                  </a:tcPr>
+                </a:tc>
+                <a:tc>
+                  <a:txBody>
+                    <a:bodyPr/>
+                    <a:lstStyle/>
+                    <a:p>
+                      <a:r>
+                        <a:rPr lang="fr-FR" sz="1200" dirty="0"/>
+                        <a:t>distance</a:t>
+                      </a:r>
+                    </a:p>
+                  </a:txBody>
+                  <a:tcPr anchor="ctr">
+                    <a:solidFill>
+                      <a:schemeClr val="bg2"/>
+                    </a:solidFill>
+                  </a:tcPr>
+                </a:tc>
+                <a:tc>
+                  <a:txBody>
+                    <a:bodyPr/>
+                    <a:lstStyle/>
+                    <a:p>
+                      <a:r>
+                        <a:rPr lang="fr-FR" sz="1200" dirty="0"/>
+                        <a:t>7,6</a:t>
+                      </a:r>
+                    </a:p>
+                  </a:txBody>
+                  <a:tcPr>
+                    <a:solidFill>
+                      <a:schemeClr val="bg2"/>
+                    </a:solidFill>
+                  </a:tcPr>
+                </a:tc>
+                <a:extLst>
+                  <a:ext uri="{0D108BD9-81ED-4DB2-BD59-A6C34878D82A}">
+                    <a16:rowId xmlns:a16="http://schemas.microsoft.com/office/drawing/2014/main" val="822897547"/>
+                  </a:ext>
+                </a:extLst>
+              </a:tr>
+              <a:tr h="370840">
+                <a:tc>
+                  <a:txBody>
+                    <a:bodyPr/>
+                    <a:lstStyle/>
+                    <a:p>
+                      <a:pPr algn="ctr"/>
+                      <a:r>
+                        <a:rPr lang="fr-FR" sz="1200" dirty="0"/>
+                        <a:t>H</a:t>
+                      </a:r>
+                    </a:p>
+                  </a:txBody>
+                  <a:tcPr anchor="ctr">
+                    <a:solidFill>
+                      <a:schemeClr val="bg2"/>
+                    </a:solidFill>
+                  </a:tcPr>
+                </a:tc>
+                <a:tc>
+                  <a:txBody>
+                    <a:bodyPr/>
+                    <a:lstStyle/>
+                    <a:p>
+                      <a:pPr marL="0" marR="0" lvl="0" indent="0" algn="l" defTabSz="914400" rtl="0" eaLnBrk="1" fontAlgn="auto" latinLnBrk="0" hangingPunct="1">
+                        <a:lnSpc>
+                          <a:spcPct val="100000"/>
+                        </a:lnSpc>
+                        <a:spcBef>
+                          <a:spcPts val="0"/>
+                        </a:spcBef>
+                        <a:spcAft>
+                          <a:spcPts val="0"/>
+                        </a:spcAft>
+                        <a:buClrTx/>
+                        <a:buSzTx/>
+                        <a:buFontTx/>
+                        <a:buNone/>
+                        <a:tabLst/>
+                        <a:defRPr/>
+                      </a:pPr>
+                      <a:r>
+                        <a:rPr lang="fr-FR" sz="1200" dirty="0"/>
+                        <a:t>Distance entre con (b) et bord de carte sup. (avec </a:t>
+                      </a:r>
+                      <a:r>
+                        <a:rPr lang="fr-FR" sz="1200" dirty="0" err="1"/>
+                        <a:t>ep</a:t>
+                      </a:r>
+                      <a:r>
+                        <a:rPr lang="fr-FR" sz="1200" dirty="0"/>
+                        <a:t>. Con)</a:t>
+                      </a:r>
+                    </a:p>
+                  </a:txBody>
+                  <a:tcPr anchor="ctr">
+                    <a:solidFill>
+                      <a:schemeClr val="bg2"/>
+                    </a:solidFill>
+                  </a:tcPr>
+                </a:tc>
+                <a:tc>
+                  <a:txBody>
+                    <a:bodyPr/>
+                    <a:lstStyle/>
+                    <a:p>
+                      <a:r>
+                        <a:rPr lang="fr-FR" sz="1200" dirty="0"/>
+                        <a:t>Distance</a:t>
+                      </a:r>
+                    </a:p>
+                  </a:txBody>
+                  <a:tcPr anchor="ctr">
+                    <a:solidFill>
+                      <a:schemeClr val="bg2"/>
+                    </a:solidFill>
+                  </a:tcPr>
+                </a:tc>
+                <a:tc>
+                  <a:txBody>
+                    <a:bodyPr/>
+                    <a:lstStyle/>
+                    <a:p>
+                      <a:r>
+                        <a:rPr lang="fr-FR" sz="1200" dirty="0"/>
+                        <a:t>17,4</a:t>
+                      </a:r>
+                    </a:p>
+                  </a:txBody>
+                  <a:tcPr>
+                    <a:solidFill>
+                      <a:schemeClr val="bg2"/>
+                    </a:solidFill>
+                  </a:tcPr>
+                </a:tc>
+                <a:extLst>
+                  <a:ext uri="{0D108BD9-81ED-4DB2-BD59-A6C34878D82A}">
+                    <a16:rowId xmlns:a16="http://schemas.microsoft.com/office/drawing/2014/main" val="2392304345"/>
+                  </a:ext>
+                </a:extLst>
+              </a:tr>
+            </a:tbl>
+          </a:graphicData>
+        </a:graphic>
+      </p:graphicFrame>
+      <p:pic>
+        <p:nvPicPr>
+          <p:cNvPr id="10" name="Image 9" descr="Une image contenant texte, équipement électronique&#10;&#10;Description générée automatiquement">
+            <a:extLst>
+              <a:ext uri="{FF2B5EF4-FFF2-40B4-BE49-F238E27FC236}">
+                <a16:creationId xmlns:a16="http://schemas.microsoft.com/office/drawing/2014/main" id="{E6E4BD98-217A-C3C6-13CF-BBDFD97CB486}"/>
+              </a:ext>
+            </a:extLst>
+          </p:cNvPr>
+          <p:cNvPicPr>
+            <a:picLocks noChangeAspect="1"/>
+          </p:cNvPicPr>
+          <p:nvPr/>
+        </p:nvPicPr>
+        <p:blipFill>
+          <a:blip r:embed="rId4">
+            <a:extLst>
+              <a:ext uri="{28A0092B-C50C-407E-A947-70E740481C1C}">
+                <a14:useLocalDpi xmlns:a14="http://schemas.microsoft.com/office/drawing/2010/main" val="0"/>
+              </a:ext>
+            </a:extLst>
+          </a:blip>
+          <a:stretch>
+            <a:fillRect/>
+          </a:stretch>
+        </p:blipFill>
+        <p:spPr>
+          <a:xfrm>
+            <a:off x="318067" y="5135312"/>
+            <a:ext cx="2695951" cy="1381318"/>
+          </a:xfrm>
+          <a:prstGeom prst="rect">
+            <a:avLst/>
+          </a:prstGeom>
+        </p:spPr>
+      </p:pic>
+      <p:pic>
+        <p:nvPicPr>
+          <p:cNvPr id="12" name="Image 11" descr="Une image contenant texte, équipement électronique&#10;&#10;Description générée automatiquement">
+            <a:extLst>
+              <a:ext uri="{FF2B5EF4-FFF2-40B4-BE49-F238E27FC236}">
+                <a16:creationId xmlns:a16="http://schemas.microsoft.com/office/drawing/2014/main" id="{B692BC67-61A0-9DBE-C75F-32ACE7FB4847}"/>
+              </a:ext>
+            </a:extLst>
+          </p:cNvPr>
+          <p:cNvPicPr>
+            <a:picLocks noChangeAspect="1"/>
+          </p:cNvPicPr>
+          <p:nvPr/>
+        </p:nvPicPr>
+        <p:blipFill rotWithShape="1">
+          <a:blip r:embed="rId5">
+            <a:extLst>
+              <a:ext uri="{28A0092B-C50C-407E-A947-70E740481C1C}">
+                <a14:useLocalDpi xmlns:a14="http://schemas.microsoft.com/office/drawing/2010/main" val="0"/>
+              </a:ext>
+            </a:extLst>
+          </a:blip>
+          <a:srcRect l="5769" b="10680"/>
+          <a:stretch/>
+        </p:blipFill>
+        <p:spPr>
+          <a:xfrm>
+            <a:off x="2341521" y="1482570"/>
+            <a:ext cx="2082737" cy="4172505"/>
+          </a:xfrm>
+          <a:prstGeom prst="rect">
+            <a:avLst/>
+          </a:prstGeom>
+        </p:spPr>
+      </p:pic>
+      <p:cxnSp>
+        <p:nvCxnSpPr>
+          <p:cNvPr id="14" name="Connecteur droit avec flèche 13">
+            <a:extLst>
+              <a:ext uri="{FF2B5EF4-FFF2-40B4-BE49-F238E27FC236}">
+                <a16:creationId xmlns:a16="http://schemas.microsoft.com/office/drawing/2014/main" id="{5C450AB8-9166-C75B-6B69-4566DA8CBDD8}"/>
+              </a:ext>
+            </a:extLst>
+          </p:cNvPr>
+          <p:cNvCxnSpPr/>
+          <p:nvPr/>
+        </p:nvCxnSpPr>
+        <p:spPr>
+          <a:xfrm flipH="1">
+            <a:off x="2405849" y="2308194"/>
+            <a:ext cx="408372" cy="0"/>
+          </a:xfrm>
+          <a:prstGeom prst="straightConnector1">
+            <a:avLst/>
+          </a:prstGeom>
+          <a:ln>
+            <a:headEnd type="triangle"/>
+            <a:tailEnd type="triangle"/>
+          </a:ln>
+        </p:spPr>
+        <p:style>
+          <a:lnRef idx="1">
+            <a:schemeClr val="accent6"/>
+          </a:lnRef>
+          <a:fillRef idx="0">
+            <a:schemeClr val="accent6"/>
+          </a:fillRef>
+          <a:effectRef idx="0">
+            <a:schemeClr val="accent6"/>
+          </a:effectRef>
+          <a:fontRef idx="minor">
+            <a:schemeClr val="tx1"/>
+          </a:fontRef>
+        </p:style>
+      </p:cxnSp>
+      <p:sp>
+        <p:nvSpPr>
+          <p:cNvPr id="15" name="ZoneTexte 14">
+            <a:extLst>
+              <a:ext uri="{FF2B5EF4-FFF2-40B4-BE49-F238E27FC236}">
+                <a16:creationId xmlns:a16="http://schemas.microsoft.com/office/drawing/2014/main" id="{92A00992-4C83-2885-58B2-EEF66CEC5636}"/>
+              </a:ext>
+            </a:extLst>
+          </p:cNvPr>
+          <p:cNvSpPr txBox="1"/>
+          <p:nvPr/>
+        </p:nvSpPr>
+        <p:spPr>
+          <a:xfrm>
+            <a:off x="2291001" y="1853617"/>
+            <a:ext cx="638068" cy="369332"/>
+          </a:xfrm>
+          <a:prstGeom prst="rect">
+            <a:avLst/>
+          </a:prstGeom>
+          <a:noFill/>
+          <a:ln>
+            <a:noFill/>
+          </a:ln>
+        </p:spPr>
+        <p:txBody>
+          <a:bodyPr wrap="square" rtlCol="0">
+            <a:spAutoFit/>
+          </a:bodyPr>
+          <a:lstStyle/>
+          <a:p>
+            <a:pPr algn="ctr"/>
+            <a:r>
+              <a:rPr lang="fr-FR" dirty="0">
+                <a:solidFill>
+                  <a:schemeClr val="accent6">
+                    <a:lumMod val="75000"/>
+                  </a:schemeClr>
+                </a:solidFill>
+              </a:rPr>
+              <a:t>(A)</a:t>
+            </a:r>
+          </a:p>
+        </p:txBody>
+      </p:sp>
+      <p:cxnSp>
+        <p:nvCxnSpPr>
+          <p:cNvPr id="16" name="Connecteur droit avec flèche 15">
+            <a:extLst>
+              <a:ext uri="{FF2B5EF4-FFF2-40B4-BE49-F238E27FC236}">
+                <a16:creationId xmlns:a16="http://schemas.microsoft.com/office/drawing/2014/main" id="{3E3D2CC1-D4A7-5520-CEB0-F2B289A6C6EB}"/>
+              </a:ext>
+            </a:extLst>
+          </p:cNvPr>
+          <p:cNvCxnSpPr>
+            <a:cxnSpLocks/>
+          </p:cNvCxnSpPr>
+          <p:nvPr/>
+        </p:nvCxnSpPr>
+        <p:spPr>
+          <a:xfrm flipH="1">
+            <a:off x="4047946" y="2336306"/>
+            <a:ext cx="204186" cy="0"/>
+          </a:xfrm>
+          <a:prstGeom prst="straightConnector1">
+            <a:avLst/>
+          </a:prstGeom>
+          <a:ln>
+            <a:headEnd type="triangle"/>
+            <a:tailEnd type="triangle"/>
+          </a:ln>
+        </p:spPr>
+        <p:style>
+          <a:lnRef idx="1">
+            <a:schemeClr val="accent6"/>
+          </a:lnRef>
+          <a:fillRef idx="0">
+            <a:schemeClr val="accent6"/>
+          </a:fillRef>
+          <a:effectRef idx="0">
+            <a:schemeClr val="accent6"/>
+          </a:effectRef>
+          <a:fontRef idx="minor">
+            <a:schemeClr val="tx1"/>
+          </a:fontRef>
+        </p:style>
+      </p:cxnSp>
+      <p:sp>
+        <p:nvSpPr>
+          <p:cNvPr id="18" name="ZoneTexte 17">
+            <a:extLst>
+              <a:ext uri="{FF2B5EF4-FFF2-40B4-BE49-F238E27FC236}">
+                <a16:creationId xmlns:a16="http://schemas.microsoft.com/office/drawing/2014/main" id="{90CF65C5-2818-7B7B-1EDF-D3668426CD86}"/>
+              </a:ext>
+            </a:extLst>
+          </p:cNvPr>
+          <p:cNvSpPr txBox="1"/>
+          <p:nvPr/>
+        </p:nvSpPr>
+        <p:spPr>
+          <a:xfrm>
+            <a:off x="3868153" y="1938862"/>
+            <a:ext cx="638068" cy="369332"/>
+          </a:xfrm>
+          <a:prstGeom prst="rect">
+            <a:avLst/>
+          </a:prstGeom>
+          <a:noFill/>
+          <a:ln>
+            <a:noFill/>
+          </a:ln>
+        </p:spPr>
+        <p:txBody>
+          <a:bodyPr wrap="square" rtlCol="0">
+            <a:spAutoFit/>
+          </a:bodyPr>
+          <a:lstStyle/>
+          <a:p>
+            <a:pPr algn="ctr"/>
+            <a:r>
+              <a:rPr lang="fr-FR" dirty="0">
+                <a:solidFill>
+                  <a:schemeClr val="accent6">
+                    <a:lumMod val="75000"/>
+                  </a:schemeClr>
+                </a:solidFill>
+              </a:rPr>
+              <a:t>(B)</a:t>
+            </a:r>
+          </a:p>
+        </p:txBody>
+      </p:sp>
+      <p:cxnSp>
+        <p:nvCxnSpPr>
+          <p:cNvPr id="19" name="Connecteur droit avec flèche 18">
+            <a:extLst>
+              <a:ext uri="{FF2B5EF4-FFF2-40B4-BE49-F238E27FC236}">
+                <a16:creationId xmlns:a16="http://schemas.microsoft.com/office/drawing/2014/main" id="{3FFAB565-D1D1-1846-529A-E89B4A2BF5DD}"/>
+              </a:ext>
+            </a:extLst>
+          </p:cNvPr>
+          <p:cNvCxnSpPr>
+            <a:cxnSpLocks/>
+          </p:cNvCxnSpPr>
+          <p:nvPr/>
+        </p:nvCxnSpPr>
+        <p:spPr>
+          <a:xfrm flipV="1">
+            <a:off x="3014018" y="1749253"/>
+            <a:ext cx="0" cy="189609"/>
+          </a:xfrm>
+          <a:prstGeom prst="straightConnector1">
+            <a:avLst/>
+          </a:prstGeom>
+          <a:ln>
+            <a:headEnd type="triangle"/>
+            <a:tailEnd type="triangle"/>
+          </a:ln>
+        </p:spPr>
+        <p:style>
+          <a:lnRef idx="1">
+            <a:schemeClr val="accent6"/>
+          </a:lnRef>
+          <a:fillRef idx="0">
+            <a:schemeClr val="accent6"/>
+          </a:fillRef>
+          <a:effectRef idx="0">
+            <a:schemeClr val="accent6"/>
+          </a:effectRef>
+          <a:fontRef idx="minor">
+            <a:schemeClr val="tx1"/>
+          </a:fontRef>
+        </p:style>
+      </p:cxnSp>
+      <p:sp>
+        <p:nvSpPr>
+          <p:cNvPr id="22" name="ZoneTexte 21">
+            <a:extLst>
+              <a:ext uri="{FF2B5EF4-FFF2-40B4-BE49-F238E27FC236}">
+                <a16:creationId xmlns:a16="http://schemas.microsoft.com/office/drawing/2014/main" id="{A1F6303C-B8E6-07FB-8897-25B4B43912F3}"/>
+              </a:ext>
+            </a:extLst>
+          </p:cNvPr>
+          <p:cNvSpPr txBox="1"/>
+          <p:nvPr/>
+        </p:nvSpPr>
+        <p:spPr>
+          <a:xfrm>
+            <a:off x="2522957" y="1446639"/>
+            <a:ext cx="638068" cy="369332"/>
+          </a:xfrm>
+          <a:prstGeom prst="rect">
+            <a:avLst/>
+          </a:prstGeom>
+          <a:noFill/>
+          <a:ln>
+            <a:noFill/>
+          </a:ln>
+        </p:spPr>
+        <p:txBody>
+          <a:bodyPr wrap="square" rtlCol="0">
+            <a:spAutoFit/>
+          </a:bodyPr>
+          <a:lstStyle/>
+          <a:p>
+            <a:pPr algn="ctr"/>
+            <a:r>
+              <a:rPr lang="fr-FR" dirty="0">
+                <a:solidFill>
+                  <a:schemeClr val="accent6">
+                    <a:lumMod val="75000"/>
+                  </a:schemeClr>
+                </a:solidFill>
+              </a:rPr>
+              <a:t>(C)</a:t>
+            </a:r>
+          </a:p>
+        </p:txBody>
+      </p:sp>
+      <p:cxnSp>
+        <p:nvCxnSpPr>
+          <p:cNvPr id="23" name="Connecteur droit avec flèche 22">
+            <a:extLst>
+              <a:ext uri="{FF2B5EF4-FFF2-40B4-BE49-F238E27FC236}">
+                <a16:creationId xmlns:a16="http://schemas.microsoft.com/office/drawing/2014/main" id="{1A5CDE5B-85F9-2942-3851-019B13E4970E}"/>
+              </a:ext>
+            </a:extLst>
+          </p:cNvPr>
+          <p:cNvCxnSpPr>
+            <a:cxnSpLocks/>
+          </p:cNvCxnSpPr>
+          <p:nvPr/>
+        </p:nvCxnSpPr>
+        <p:spPr>
+          <a:xfrm flipH="1">
+            <a:off x="3014018" y="2709168"/>
+            <a:ext cx="854135" cy="0"/>
+          </a:xfrm>
+          <a:prstGeom prst="straightConnector1">
+            <a:avLst/>
+          </a:prstGeom>
+          <a:ln>
+            <a:headEnd type="triangle"/>
+            <a:tailEnd type="triangle"/>
+          </a:ln>
+        </p:spPr>
+        <p:style>
+          <a:lnRef idx="1">
+            <a:schemeClr val="accent6"/>
+          </a:lnRef>
+          <a:fillRef idx="0">
+            <a:schemeClr val="accent6"/>
+          </a:fillRef>
+          <a:effectRef idx="0">
+            <a:schemeClr val="accent6"/>
+          </a:effectRef>
+          <a:fontRef idx="minor">
+            <a:schemeClr val="tx1"/>
+          </a:fontRef>
+        </p:style>
+      </p:cxnSp>
+      <p:sp>
+        <p:nvSpPr>
+          <p:cNvPr id="25" name="ZoneTexte 24">
+            <a:extLst>
+              <a:ext uri="{FF2B5EF4-FFF2-40B4-BE49-F238E27FC236}">
+                <a16:creationId xmlns:a16="http://schemas.microsoft.com/office/drawing/2014/main" id="{314745E6-BEBE-6AA5-7696-5B07CDE91251}"/>
+              </a:ext>
+            </a:extLst>
+          </p:cNvPr>
+          <p:cNvSpPr txBox="1"/>
+          <p:nvPr/>
+        </p:nvSpPr>
+        <p:spPr>
+          <a:xfrm>
+            <a:off x="2841991" y="2694993"/>
+            <a:ext cx="638068" cy="369332"/>
+          </a:xfrm>
+          <a:prstGeom prst="rect">
+            <a:avLst/>
+          </a:prstGeom>
+          <a:noFill/>
+          <a:ln>
+            <a:noFill/>
+          </a:ln>
+        </p:spPr>
+        <p:txBody>
+          <a:bodyPr wrap="square" rtlCol="0">
+            <a:spAutoFit/>
+          </a:bodyPr>
+          <a:lstStyle/>
+          <a:p>
+            <a:pPr algn="ctr"/>
+            <a:r>
+              <a:rPr lang="fr-FR" dirty="0">
+                <a:solidFill>
+                  <a:schemeClr val="accent6">
+                    <a:lumMod val="75000"/>
+                  </a:schemeClr>
+                </a:solidFill>
+              </a:rPr>
+              <a:t>(D)</a:t>
+            </a:r>
+          </a:p>
+        </p:txBody>
+      </p:sp>
+      <p:sp>
+        <p:nvSpPr>
+          <p:cNvPr id="26" name="ZoneTexte 25">
+            <a:extLst>
+              <a:ext uri="{FF2B5EF4-FFF2-40B4-BE49-F238E27FC236}">
+                <a16:creationId xmlns:a16="http://schemas.microsoft.com/office/drawing/2014/main" id="{F47B2614-D494-A8E8-5EFF-8FBAF566A080}"/>
+              </a:ext>
+            </a:extLst>
+          </p:cNvPr>
+          <p:cNvSpPr txBox="1"/>
+          <p:nvPr/>
+        </p:nvSpPr>
+        <p:spPr>
+          <a:xfrm>
+            <a:off x="3827172" y="2524502"/>
+            <a:ext cx="638068" cy="369332"/>
+          </a:xfrm>
+          <a:prstGeom prst="rect">
+            <a:avLst/>
+          </a:prstGeom>
+          <a:noFill/>
+          <a:ln>
+            <a:noFill/>
+          </a:ln>
+        </p:spPr>
+        <p:txBody>
+          <a:bodyPr wrap="square" rtlCol="0">
+            <a:spAutoFit/>
+          </a:bodyPr>
+          <a:lstStyle/>
+          <a:p>
+            <a:pPr algn="ctr"/>
+            <a:r>
+              <a:rPr lang="fr-FR" dirty="0">
+                <a:solidFill>
+                  <a:srgbClr val="00B0F0"/>
+                </a:solidFill>
+              </a:rPr>
+              <a:t>(AA)</a:t>
+            </a:r>
+          </a:p>
+        </p:txBody>
+      </p:sp>
+      <p:cxnSp>
+        <p:nvCxnSpPr>
+          <p:cNvPr id="27" name="Connecteur droit avec flèche 26">
+            <a:extLst>
+              <a:ext uri="{FF2B5EF4-FFF2-40B4-BE49-F238E27FC236}">
+                <a16:creationId xmlns:a16="http://schemas.microsoft.com/office/drawing/2014/main" id="{F589B0B2-7143-BA87-8612-95DC7337B566}"/>
+              </a:ext>
+            </a:extLst>
+          </p:cNvPr>
+          <p:cNvCxnSpPr>
+            <a:cxnSpLocks/>
+          </p:cNvCxnSpPr>
+          <p:nvPr/>
+        </p:nvCxnSpPr>
+        <p:spPr>
+          <a:xfrm>
+            <a:off x="467607" y="1938862"/>
+            <a:ext cx="0" cy="773264"/>
+          </a:xfrm>
+          <a:prstGeom prst="straightConnector1">
+            <a:avLst/>
+          </a:prstGeom>
+          <a:ln>
+            <a:headEnd type="triangle"/>
+            <a:tailEnd type="triangle"/>
+          </a:ln>
+        </p:spPr>
+        <p:style>
+          <a:lnRef idx="1">
+            <a:schemeClr val="accent6"/>
+          </a:lnRef>
+          <a:fillRef idx="0">
+            <a:schemeClr val="accent6"/>
+          </a:fillRef>
+          <a:effectRef idx="0">
+            <a:schemeClr val="accent6"/>
+          </a:effectRef>
+          <a:fontRef idx="minor">
+            <a:schemeClr val="tx1"/>
+          </a:fontRef>
+        </p:style>
+      </p:cxnSp>
+      <p:sp>
+        <p:nvSpPr>
+          <p:cNvPr id="29" name="ZoneTexte 28">
+            <a:extLst>
+              <a:ext uri="{FF2B5EF4-FFF2-40B4-BE49-F238E27FC236}">
+                <a16:creationId xmlns:a16="http://schemas.microsoft.com/office/drawing/2014/main" id="{3EDDE289-2DAB-5A80-A286-0EB217042C28}"/>
+              </a:ext>
+            </a:extLst>
+          </p:cNvPr>
+          <p:cNvSpPr txBox="1"/>
+          <p:nvPr/>
+        </p:nvSpPr>
+        <p:spPr>
+          <a:xfrm>
+            <a:off x="-240848" y="2222949"/>
+            <a:ext cx="638068" cy="369332"/>
+          </a:xfrm>
+          <a:prstGeom prst="rect">
+            <a:avLst/>
+          </a:prstGeom>
+          <a:noFill/>
+          <a:ln>
+            <a:noFill/>
+          </a:ln>
+        </p:spPr>
+        <p:txBody>
+          <a:bodyPr wrap="square" rtlCol="0">
+            <a:spAutoFit/>
+          </a:bodyPr>
+          <a:lstStyle/>
+          <a:p>
+            <a:pPr algn="ctr"/>
+            <a:r>
+              <a:rPr lang="fr-FR" dirty="0">
+                <a:solidFill>
+                  <a:schemeClr val="accent6">
+                    <a:lumMod val="75000"/>
+                  </a:schemeClr>
+                </a:solidFill>
+              </a:rPr>
+              <a:t>(E)</a:t>
+            </a:r>
+          </a:p>
+        </p:txBody>
+      </p:sp>
+      <p:cxnSp>
+        <p:nvCxnSpPr>
+          <p:cNvPr id="30" name="Connecteur droit avec flèche 29">
+            <a:extLst>
+              <a:ext uri="{FF2B5EF4-FFF2-40B4-BE49-F238E27FC236}">
+                <a16:creationId xmlns:a16="http://schemas.microsoft.com/office/drawing/2014/main" id="{201423BF-F56C-90FA-3344-E8FED1EAE8C4}"/>
+              </a:ext>
+            </a:extLst>
+          </p:cNvPr>
+          <p:cNvCxnSpPr>
+            <a:cxnSpLocks/>
+          </p:cNvCxnSpPr>
+          <p:nvPr/>
+        </p:nvCxnSpPr>
+        <p:spPr>
+          <a:xfrm flipV="1">
+            <a:off x="3509577" y="1626362"/>
+            <a:ext cx="0" cy="189609"/>
+          </a:xfrm>
+          <a:prstGeom prst="straightConnector1">
+            <a:avLst/>
+          </a:prstGeom>
+          <a:ln>
+            <a:solidFill>
+              <a:srgbClr val="FF0000"/>
+            </a:solidFill>
+            <a:headEnd type="triangle"/>
+            <a:tailEnd type="triangle"/>
+          </a:ln>
+        </p:spPr>
+        <p:style>
+          <a:lnRef idx="1">
+            <a:schemeClr val="accent6"/>
+          </a:lnRef>
+          <a:fillRef idx="0">
+            <a:schemeClr val="accent6"/>
+          </a:fillRef>
+          <a:effectRef idx="0">
+            <a:schemeClr val="accent6"/>
+          </a:effectRef>
+          <a:fontRef idx="minor">
+            <a:schemeClr val="tx1"/>
+          </a:fontRef>
+        </p:style>
+      </p:cxnSp>
+      <p:sp>
+        <p:nvSpPr>
+          <p:cNvPr id="31" name="ZoneTexte 30">
+            <a:extLst>
+              <a:ext uri="{FF2B5EF4-FFF2-40B4-BE49-F238E27FC236}">
+                <a16:creationId xmlns:a16="http://schemas.microsoft.com/office/drawing/2014/main" id="{87CE05E6-2112-5BA6-C303-0C03DBF34046}"/>
+              </a:ext>
+            </a:extLst>
+          </p:cNvPr>
+          <p:cNvSpPr txBox="1"/>
+          <p:nvPr/>
+        </p:nvSpPr>
+        <p:spPr>
+          <a:xfrm>
+            <a:off x="3374634" y="1319792"/>
+            <a:ext cx="638068" cy="369332"/>
+          </a:xfrm>
+          <a:prstGeom prst="rect">
+            <a:avLst/>
+          </a:prstGeom>
+          <a:noFill/>
+          <a:ln>
+            <a:noFill/>
+          </a:ln>
+        </p:spPr>
+        <p:txBody>
+          <a:bodyPr wrap="square" rtlCol="0">
+            <a:spAutoFit/>
+          </a:bodyPr>
+          <a:lstStyle/>
+          <a:p>
+            <a:pPr algn="ctr"/>
+            <a:r>
+              <a:rPr lang="fr-FR" dirty="0">
+                <a:solidFill>
+                  <a:srgbClr val="FF0000"/>
+                </a:solidFill>
+              </a:rPr>
+              <a:t>(F)</a:t>
+            </a:r>
+          </a:p>
+        </p:txBody>
+      </p:sp>
+      <p:cxnSp>
+        <p:nvCxnSpPr>
+          <p:cNvPr id="32" name="Connecteur droit avec flèche 31">
+            <a:extLst>
+              <a:ext uri="{FF2B5EF4-FFF2-40B4-BE49-F238E27FC236}">
+                <a16:creationId xmlns:a16="http://schemas.microsoft.com/office/drawing/2014/main" id="{A8C6D390-11AA-4F67-7ED8-F2EDBD9A126E}"/>
+              </a:ext>
+            </a:extLst>
+          </p:cNvPr>
+          <p:cNvCxnSpPr>
+            <a:cxnSpLocks/>
+          </p:cNvCxnSpPr>
+          <p:nvPr/>
+        </p:nvCxnSpPr>
+        <p:spPr>
+          <a:xfrm flipV="1">
+            <a:off x="3998029" y="1749253"/>
+            <a:ext cx="0" cy="317117"/>
+          </a:xfrm>
+          <a:prstGeom prst="straightConnector1">
+            <a:avLst/>
+          </a:prstGeom>
+          <a:ln>
+            <a:solidFill>
+              <a:srgbClr val="FF0000"/>
+            </a:solidFill>
+            <a:headEnd type="triangle"/>
+            <a:tailEnd type="triangle"/>
+          </a:ln>
+        </p:spPr>
+        <p:style>
+          <a:lnRef idx="1">
+            <a:schemeClr val="accent6"/>
+          </a:lnRef>
+          <a:fillRef idx="0">
+            <a:schemeClr val="accent6"/>
+          </a:fillRef>
+          <a:effectRef idx="0">
+            <a:schemeClr val="accent6"/>
+          </a:effectRef>
+          <a:fontRef idx="minor">
+            <a:schemeClr val="tx1"/>
+          </a:fontRef>
+        </p:style>
+      </p:cxnSp>
+      <p:sp>
+        <p:nvSpPr>
+          <p:cNvPr id="34" name="ZoneTexte 33">
+            <a:extLst>
+              <a:ext uri="{FF2B5EF4-FFF2-40B4-BE49-F238E27FC236}">
+                <a16:creationId xmlns:a16="http://schemas.microsoft.com/office/drawing/2014/main" id="{33588FA4-53B1-B53B-C8EA-A0438C12F923}"/>
+              </a:ext>
+            </a:extLst>
+          </p:cNvPr>
+          <p:cNvSpPr txBox="1"/>
+          <p:nvPr/>
+        </p:nvSpPr>
+        <p:spPr>
+          <a:xfrm>
+            <a:off x="3806681" y="1464122"/>
+            <a:ext cx="638068" cy="369332"/>
+          </a:xfrm>
+          <a:prstGeom prst="rect">
+            <a:avLst/>
+          </a:prstGeom>
+          <a:noFill/>
+          <a:ln>
+            <a:noFill/>
+          </a:ln>
+        </p:spPr>
+        <p:txBody>
+          <a:bodyPr wrap="square" rtlCol="0">
+            <a:spAutoFit/>
+          </a:bodyPr>
+          <a:lstStyle/>
+          <a:p>
+            <a:pPr algn="ctr"/>
+            <a:r>
+              <a:rPr lang="fr-FR" dirty="0">
+                <a:solidFill>
+                  <a:srgbClr val="FF0000"/>
+                </a:solidFill>
+              </a:rPr>
+              <a:t>(G)</a:t>
+            </a:r>
+          </a:p>
+        </p:txBody>
+      </p:sp>
+      <p:cxnSp>
+        <p:nvCxnSpPr>
+          <p:cNvPr id="35" name="Connecteur droit avec flèche 34">
+            <a:extLst>
+              <a:ext uri="{FF2B5EF4-FFF2-40B4-BE49-F238E27FC236}">
+                <a16:creationId xmlns:a16="http://schemas.microsoft.com/office/drawing/2014/main" id="{5B045BB7-9B90-7E10-EFCA-E7591469F564}"/>
+              </a:ext>
+            </a:extLst>
+          </p:cNvPr>
+          <p:cNvCxnSpPr>
+            <a:cxnSpLocks/>
+          </p:cNvCxnSpPr>
+          <p:nvPr/>
+        </p:nvCxnSpPr>
+        <p:spPr>
+          <a:xfrm flipV="1">
+            <a:off x="3806681" y="1721166"/>
+            <a:ext cx="3879" cy="988002"/>
+          </a:xfrm>
+          <a:prstGeom prst="straightConnector1">
+            <a:avLst/>
+          </a:prstGeom>
+          <a:ln>
+            <a:solidFill>
+              <a:srgbClr val="FF0000"/>
+            </a:solidFill>
+            <a:headEnd type="triangle"/>
+            <a:tailEnd type="triangle"/>
+          </a:ln>
+        </p:spPr>
+        <p:style>
+          <a:lnRef idx="1">
+            <a:schemeClr val="accent6"/>
+          </a:lnRef>
+          <a:fillRef idx="0">
+            <a:schemeClr val="accent6"/>
+          </a:fillRef>
+          <a:effectRef idx="0">
+            <a:schemeClr val="accent6"/>
+          </a:effectRef>
+          <a:fontRef idx="minor">
+            <a:schemeClr val="tx1"/>
+          </a:fontRef>
+        </p:style>
+      </p:cxnSp>
+      <p:sp>
+        <p:nvSpPr>
+          <p:cNvPr id="37" name="ZoneTexte 36">
+            <a:extLst>
+              <a:ext uri="{FF2B5EF4-FFF2-40B4-BE49-F238E27FC236}">
+                <a16:creationId xmlns:a16="http://schemas.microsoft.com/office/drawing/2014/main" id="{54F86B55-64FC-42E7-7118-E530A353EF93}"/>
+              </a:ext>
+            </a:extLst>
+          </p:cNvPr>
+          <p:cNvSpPr txBox="1"/>
+          <p:nvPr/>
+        </p:nvSpPr>
+        <p:spPr>
+          <a:xfrm>
+            <a:off x="3312502" y="2314949"/>
+            <a:ext cx="638068" cy="369332"/>
+          </a:xfrm>
+          <a:prstGeom prst="rect">
+            <a:avLst/>
+          </a:prstGeom>
+          <a:noFill/>
+          <a:ln>
+            <a:noFill/>
+          </a:ln>
+        </p:spPr>
+        <p:txBody>
+          <a:bodyPr wrap="square" rtlCol="0">
+            <a:spAutoFit/>
+          </a:bodyPr>
+          <a:lstStyle/>
+          <a:p>
+            <a:pPr algn="ctr"/>
+            <a:r>
+              <a:rPr lang="fr-FR" dirty="0">
+                <a:solidFill>
+                  <a:srgbClr val="FF0000"/>
+                </a:solidFill>
+              </a:rPr>
+              <a:t>(H)</a:t>
+            </a:r>
+          </a:p>
+        </p:txBody>
+      </p:sp>
+    </p:spTree>
+    <p:extLst>
+      <p:ext uri="{BB962C8B-B14F-4D97-AF65-F5344CB8AC3E}">
+        <p14:creationId xmlns:p14="http://schemas.microsoft.com/office/powerpoint/2010/main" val="123305018"/>
       </p:ext>
     </p:extLst>
   </p:cSld>

</xml_diff>